<commit_message>
uptade Maximilian, Victoria schaut nochmal drueber und aendert foto
</commit_message>
<xml_diff>
--- a/BallFall.pptx
+++ b/BallFall.pptx
@@ -5,17 +5,21 @@
     <p:sldMasterId id="2147483648" r:id="rId1"/>
   </p:sldMasterIdLst>
   <p:notesMasterIdLst>
-    <p:notesMasterId r:id="rId10"/>
+    <p:notesMasterId r:id="rId14"/>
   </p:notesMasterIdLst>
   <p:sldIdLst>
     <p:sldId id="256" r:id="rId2"/>
     <p:sldId id="264" r:id="rId3"/>
     <p:sldId id="257" r:id="rId4"/>
-    <p:sldId id="263" r:id="rId5"/>
-    <p:sldId id="258" r:id="rId6"/>
-    <p:sldId id="265" r:id="rId7"/>
-    <p:sldId id="262" r:id="rId8"/>
-    <p:sldId id="259" r:id="rId9"/>
+    <p:sldId id="269" r:id="rId5"/>
+    <p:sldId id="263" r:id="rId6"/>
+    <p:sldId id="258" r:id="rId7"/>
+    <p:sldId id="265" r:id="rId8"/>
+    <p:sldId id="262" r:id="rId9"/>
+    <p:sldId id="259" r:id="rId10"/>
+    <p:sldId id="266" r:id="rId11"/>
+    <p:sldId id="267" r:id="rId12"/>
+    <p:sldId id="268" r:id="rId13"/>
   </p:sldIdLst>
   <p:sldSz cx="12192000" cy="6858000"/>
   <p:notesSz cx="6858000" cy="9144000"/>
@@ -515,63 +519,6 @@
           <a:bodyPr/>
           <a:lstStyle/>
           <a:p>
-            <a:r>
-              <a:rPr lang="de-DE" dirty="0"/>
-              <a:t>-</a:t>
-            </a:r>
-            <a:r>
-              <a:rPr lang="de-DE" dirty="0" err="1"/>
-              <a:t>einzelen</a:t>
-            </a:r>
-            <a:r>
-              <a:rPr lang="de-DE" dirty="0"/>
-              <a:t> Layout Beispiele</a:t>
-            </a:r>
-          </a:p>
-          <a:p>
-            <a:endParaRPr lang="de-DE" dirty="0"/>
-          </a:p>
-          <a:p>
-            <a:r>
-              <a:rPr lang="de-DE" dirty="0"/>
-              <a:t>-</a:t>
-            </a:r>
-            <a:r>
-              <a:rPr lang="de-DE" dirty="0" err="1"/>
-              <a:t>links:z.B</a:t>
-            </a:r>
-            <a:r>
-              <a:rPr lang="de-DE" dirty="0"/>
-              <a:t>.</a:t>
-            </a:r>
-            <a:r>
-              <a:rPr lang="de-DE" baseline="0" dirty="0"/>
-              <a:t> so könnte </a:t>
-            </a:r>
-            <a:r>
-              <a:rPr lang="de-DE" baseline="0" dirty="0" err="1"/>
-              <a:t>startmenü</a:t>
-            </a:r>
-            <a:r>
-              <a:rPr lang="de-DE" baseline="0" dirty="0"/>
-              <a:t> aussehen, </a:t>
-            </a:r>
-            <a:r>
-              <a:rPr lang="de-DE" baseline="0" dirty="0" err="1"/>
-              <a:t>mitte</a:t>
-            </a:r>
-            <a:r>
-              <a:rPr lang="de-DE" baseline="0" dirty="0"/>
-              <a:t> </a:t>
-            </a:r>
-            <a:r>
-              <a:rPr lang="de-DE" baseline="0" dirty="0" err="1"/>
-              <a:t>Levelauswahl</a:t>
-            </a:r>
-            <a:r>
-              <a:rPr lang="de-DE" baseline="0" dirty="0"/>
-              <a:t> und rechts ein Beispiel wie ein Level aussehnen könnte</a:t>
-            </a:r>
             <a:endParaRPr lang="de-DE" dirty="0"/>
           </a:p>
         </p:txBody>
@@ -593,7 +540,7 @@
           <a:p>
             <a:fld id="{B3718980-F47B-4107-9E31-BBEAA60D0300}" type="slidenum">
               <a:rPr lang="de-DE" smtClean="0"/>
-              <a:t>3</a:t>
+              <a:t>1</a:t>
             </a:fld>
             <a:endParaRPr lang="de-DE"/>
           </a:p>
@@ -602,7 +549,7 @@
     </p:spTree>
     <p:extLst>
       <p:ext uri="{BB962C8B-B14F-4D97-AF65-F5344CB8AC3E}">
-        <p14:creationId xmlns:p14="http://schemas.microsoft.com/office/powerpoint/2010/main" val="3895936960"/>
+        <p14:creationId xmlns:p14="http://schemas.microsoft.com/office/powerpoint/2010/main" val="861521497"/>
       </p:ext>
     </p:extLst>
   </p:cSld>
@@ -656,93 +603,6 @@
           <a:bodyPr/>
           <a:lstStyle/>
           <a:p>
-            <a:r>
-              <a:rPr lang="de-DE" dirty="0"/>
-              <a:t>-Bildschirm ist die Oberklasse</a:t>
-            </a:r>
-          </a:p>
-          <a:p>
-            <a:endParaRPr lang="de-DE" dirty="0"/>
-          </a:p>
-          <a:p>
-            <a:r>
-              <a:rPr lang="de-DE" dirty="0"/>
-              <a:t>-Startbildschirm/</a:t>
-            </a:r>
-            <a:r>
-              <a:rPr lang="de-DE" dirty="0" err="1"/>
-              <a:t>Levelmenu</a:t>
-            </a:r>
-            <a:r>
-              <a:rPr lang="de-DE" dirty="0"/>
-              <a:t>/</a:t>
-            </a:r>
-            <a:r>
-              <a:rPr lang="de-DE" dirty="0" err="1"/>
-              <a:t>Level_X</a:t>
-            </a:r>
-            <a:r>
-              <a:rPr lang="de-DE" baseline="0" dirty="0"/>
-              <a:t> und </a:t>
-            </a:r>
-            <a:r>
-              <a:rPr lang="de-DE" baseline="0" dirty="0" err="1"/>
-              <a:t>Highscore</a:t>
-            </a:r>
-            <a:r>
-              <a:rPr lang="de-DE" baseline="0" dirty="0"/>
-              <a:t> sind Kompositionen von Bildschirm, d.h. ohne Bildschirm gibt es keine weiteren Klassen</a:t>
-            </a:r>
-          </a:p>
-          <a:p>
-            <a:endParaRPr lang="de-DE" baseline="0" dirty="0"/>
-          </a:p>
-          <a:p>
-            <a:r>
-              <a:rPr lang="de-DE" baseline="0" dirty="0"/>
-              <a:t>-Button ist eine Aggregation von </a:t>
-            </a:r>
-            <a:r>
-              <a:rPr lang="de-DE" baseline="0" dirty="0" err="1"/>
-              <a:t>Startbildschrim</a:t>
-            </a:r>
-            <a:r>
-              <a:rPr lang="de-DE" baseline="0" dirty="0"/>
-              <a:t>, </a:t>
-            </a:r>
-            <a:r>
-              <a:rPr lang="de-DE" baseline="0" dirty="0" err="1"/>
-              <a:t>Levelmenu</a:t>
-            </a:r>
-            <a:r>
-              <a:rPr lang="de-DE" baseline="0" dirty="0"/>
-              <a:t>, </a:t>
-            </a:r>
-            <a:r>
-              <a:rPr lang="de-DE" baseline="0" dirty="0" err="1"/>
-              <a:t>Level_X</a:t>
-            </a:r>
-            <a:r>
-              <a:rPr lang="de-DE" baseline="0" dirty="0"/>
-              <a:t> und </a:t>
-            </a:r>
-            <a:r>
-              <a:rPr lang="de-DE" baseline="0" dirty="0" err="1"/>
-              <a:t>Highscore</a:t>
-            </a:r>
-            <a:r>
-              <a:rPr lang="de-DE" baseline="0" dirty="0"/>
-              <a:t>-&gt; Klassen können auch alleine existieren aber normalerweise ist Button    in die jeweiligen Klassen eingebunden</a:t>
-            </a:r>
-          </a:p>
-          <a:p>
-            <a:endParaRPr lang="de-DE" baseline="0" dirty="0"/>
-          </a:p>
-          <a:p>
-            <a:r>
-              <a:rPr lang="de-DE" baseline="0" dirty="0"/>
-              <a:t>-Physik interagiert mit Objekten ist allerdings nicht immer vorhanden???</a:t>
-            </a:r>
             <a:endParaRPr lang="de-DE" dirty="0"/>
           </a:p>
         </p:txBody>
@@ -764,7 +624,7 @@
           <a:p>
             <a:fld id="{B3718980-F47B-4107-9E31-BBEAA60D0300}" type="slidenum">
               <a:rPr lang="de-DE" smtClean="0"/>
-              <a:t>4</a:t>
+              <a:t>2</a:t>
             </a:fld>
             <a:endParaRPr lang="de-DE"/>
           </a:p>
@@ -773,7 +633,7 @@
     </p:spTree>
     <p:extLst>
       <p:ext uri="{BB962C8B-B14F-4D97-AF65-F5344CB8AC3E}">
-        <p14:creationId xmlns:p14="http://schemas.microsoft.com/office/powerpoint/2010/main" val="3261876811"/>
+        <p14:creationId xmlns:p14="http://schemas.microsoft.com/office/powerpoint/2010/main" val="3335655886"/>
       </p:ext>
     </p:extLst>
   </p:cSld>
@@ -829,51 +689,62 @@
           <a:p>
             <a:r>
               <a:rPr lang="de-DE" dirty="0"/>
-              <a:t>-Klassen von eben</a:t>
+              <a:t>-</a:t>
+            </a:r>
+            <a:r>
+              <a:rPr lang="de-DE" dirty="0" err="1"/>
+              <a:t>einzelen</a:t>
+            </a:r>
+            <a:r>
+              <a:rPr lang="de-DE" dirty="0"/>
+              <a:t> Layout Beispiele</a:t>
+            </a:r>
+          </a:p>
+          <a:p>
+            <a:endParaRPr lang="de-DE" dirty="0"/>
+          </a:p>
+          <a:p>
+            <a:r>
+              <a:rPr lang="de-DE" dirty="0"/>
+              <a:t>-</a:t>
+            </a:r>
+            <a:r>
+              <a:rPr lang="de-DE" dirty="0" err="1"/>
+              <a:t>links:z.B</a:t>
+            </a:r>
+            <a:r>
+              <a:rPr lang="de-DE" dirty="0"/>
+              <a:t>.</a:t>
             </a:r>
             <a:r>
               <a:rPr lang="de-DE" baseline="0" dirty="0"/>
-              <a:t> mit </a:t>
+              <a:t> so könnte </a:t>
             </a:r>
             <a:r>
               <a:rPr lang="de-DE" baseline="0" dirty="0" err="1"/>
-              <a:t>Beispielvariblen</a:t>
+              <a:t>startmenü</a:t>
             </a:r>
             <a:r>
               <a:rPr lang="de-DE" baseline="0" dirty="0"/>
-              <a:t> und –</a:t>
+              <a:t> aussehen, </a:t>
             </a:r>
             <a:r>
               <a:rPr lang="de-DE" baseline="0" dirty="0" err="1"/>
-              <a:t>funktionen</a:t>
-            </a:r>
-            <a:endParaRPr lang="de-DE" baseline="0" dirty="0"/>
-          </a:p>
-          <a:p>
-            <a:endParaRPr lang="de-DE" baseline="0" dirty="0"/>
-          </a:p>
-          <a:p>
+              <a:t>mitte</a:t>
+            </a:r>
             <a:r>
               <a:rPr lang="de-DE" baseline="0" dirty="0"/>
-              <a:t>-wie man hier sieht gibt die Oberklasse Bildschirm den Klassen darunter die Breite und Länge für den Bildschirm</a:t>
-            </a:r>
-          </a:p>
-          <a:p>
+              <a:t> </a:t>
+            </a:r>
+            <a:r>
+              <a:rPr lang="de-DE" baseline="0" dirty="0" err="1"/>
+              <a:t>Levelauswahl</a:t>
+            </a:r>
             <a:r>
               <a:rPr lang="de-DE" baseline="0" dirty="0"/>
-              <a:t>-“+“ </a:t>
-            </a:r>
-            <a:r>
-              <a:rPr lang="de-DE" baseline="0" dirty="0" err="1"/>
-              <a:t>public</a:t>
-            </a:r>
-            <a:endParaRPr lang="de-DE" baseline="0" dirty="0"/>
-          </a:p>
-          <a:p>
-            <a:r>
-              <a:rPr lang="de-DE" baseline="0" dirty="0"/>
-              <a:t>-“-“private</a:t>
-            </a:r>
+              <a:t> und rechts ein Beispiel wie ein Level aussehnen könnte</a:t>
+            </a:r>
+            <a:endParaRPr lang="de-DE" dirty="0"/>
           </a:p>
         </p:txBody>
       </p:sp>
@@ -894,7 +765,7 @@
           <a:p>
             <a:fld id="{B3718980-F47B-4107-9E31-BBEAA60D0300}" type="slidenum">
               <a:rPr lang="de-DE" smtClean="0"/>
-              <a:t>5</a:t>
+              <a:t>3</a:t>
             </a:fld>
             <a:endParaRPr lang="de-DE"/>
           </a:p>
@@ -903,7 +774,7 @@
     </p:spTree>
     <p:extLst>
       <p:ext uri="{BB962C8B-B14F-4D97-AF65-F5344CB8AC3E}">
-        <p14:creationId xmlns:p14="http://schemas.microsoft.com/office/powerpoint/2010/main" val="2390111728"/>
+        <p14:creationId xmlns:p14="http://schemas.microsoft.com/office/powerpoint/2010/main" val="3895936960"/>
       </p:ext>
     </p:extLst>
   </p:cSld>
@@ -958,29 +829,91 @@
           <a:lstStyle/>
           <a:p>
             <a:r>
+              <a:rPr lang="de-DE" dirty="0"/>
+              <a:t>-Bildschirm ist die Oberklasse</a:t>
+            </a:r>
+          </a:p>
+          <a:p>
+            <a:endParaRPr lang="de-DE" dirty="0"/>
+          </a:p>
+          <a:p>
+            <a:r>
+              <a:rPr lang="de-DE" dirty="0"/>
+              <a:t>-Startbildschirm/</a:t>
+            </a:r>
+            <a:r>
+              <a:rPr lang="de-DE" dirty="0" err="1"/>
+              <a:t>Levelmenu</a:t>
+            </a:r>
+            <a:r>
+              <a:rPr lang="de-DE" dirty="0"/>
+              <a:t>/</a:t>
+            </a:r>
+            <a:r>
+              <a:rPr lang="de-DE" dirty="0" err="1"/>
+              <a:t>Level_X</a:t>
+            </a:r>
+            <a:r>
               <a:rPr lang="de-DE" baseline="0" dirty="0"/>
-              <a:t>-“+“ </a:t>
+              <a:t> und </a:t>
             </a:r>
             <a:r>
               <a:rPr lang="de-DE" baseline="0" dirty="0" err="1"/>
-              <a:t>public</a:t>
-            </a:r>
+              <a:t>Highscore</a:t>
+            </a:r>
+            <a:r>
+              <a:rPr lang="de-DE" baseline="0" dirty="0"/>
+              <a:t> sind Kompositionen von Bildschirm, d.h. ohne Bildschirm gibt es keine weiteren Klassen</a:t>
+            </a:r>
+          </a:p>
+          <a:p>
             <a:endParaRPr lang="de-DE" baseline="0" dirty="0"/>
           </a:p>
           <a:p>
             <a:r>
               <a:rPr lang="de-DE" baseline="0" dirty="0"/>
-              <a:t>-“-“private</a:t>
-            </a:r>
-          </a:p>
-          <a:p>
-            <a:r>
-              <a:rPr lang="de-DE" dirty="0"/>
-              <a:t>-“#“ </a:t>
-            </a:r>
-            <a:r>
-              <a:rPr lang="de-DE" dirty="0" err="1"/>
-              <a:t>protected</a:t>
+              <a:t>-Button ist eine Aggregation von </a:t>
+            </a:r>
+            <a:r>
+              <a:rPr lang="de-DE" baseline="0" dirty="0" err="1"/>
+              <a:t>Startbildschrim</a:t>
+            </a:r>
+            <a:r>
+              <a:rPr lang="de-DE" baseline="0" dirty="0"/>
+              <a:t>, </a:t>
+            </a:r>
+            <a:r>
+              <a:rPr lang="de-DE" baseline="0" dirty="0" err="1"/>
+              <a:t>Levelmenu</a:t>
+            </a:r>
+            <a:r>
+              <a:rPr lang="de-DE" baseline="0" dirty="0"/>
+              <a:t>, </a:t>
+            </a:r>
+            <a:r>
+              <a:rPr lang="de-DE" baseline="0" dirty="0" err="1"/>
+              <a:t>Level_X</a:t>
+            </a:r>
+            <a:r>
+              <a:rPr lang="de-DE" baseline="0" dirty="0"/>
+              <a:t> und </a:t>
+            </a:r>
+            <a:r>
+              <a:rPr lang="de-DE" baseline="0" dirty="0" err="1"/>
+              <a:t>Highscore</a:t>
+            </a:r>
+            <a:r>
+              <a:rPr lang="de-DE" baseline="0" dirty="0"/>
+              <a:t>-&gt; Klassen können auch alleine existieren aber normalerweise ist Button    in die jeweiligen Klassen eingebunden</a:t>
+            </a:r>
+          </a:p>
+          <a:p>
+            <a:endParaRPr lang="de-DE" baseline="0" dirty="0"/>
+          </a:p>
+          <a:p>
+            <a:r>
+              <a:rPr lang="de-DE" baseline="0" dirty="0"/>
+              <a:t>-Physik ist in Objekten enthalten</a:t>
             </a:r>
             <a:endParaRPr lang="de-DE" dirty="0"/>
           </a:p>
@@ -1003,7 +936,7 @@
           <a:p>
             <a:fld id="{B3718980-F47B-4107-9E31-BBEAA60D0300}" type="slidenum">
               <a:rPr lang="de-DE" smtClean="0"/>
-              <a:t>6</a:t>
+              <a:t>5</a:t>
             </a:fld>
             <a:endParaRPr lang="de-DE"/>
           </a:p>
@@ -1012,7 +945,7 @@
     </p:spTree>
     <p:extLst>
       <p:ext uri="{BB962C8B-B14F-4D97-AF65-F5344CB8AC3E}">
-        <p14:creationId xmlns:p14="http://schemas.microsoft.com/office/powerpoint/2010/main" val="1459809751"/>
+        <p14:creationId xmlns:p14="http://schemas.microsoft.com/office/powerpoint/2010/main" val="3261876811"/>
       </p:ext>
     </p:extLst>
   </p:cSld>
@@ -1067,6 +1000,38 @@
           <a:lstStyle/>
           <a:p>
             <a:r>
+              <a:rPr lang="de-DE" dirty="0"/>
+              <a:t>-Klassen von eben</a:t>
+            </a:r>
+            <a:r>
+              <a:rPr lang="de-DE" baseline="0" dirty="0"/>
+              <a:t> mit </a:t>
+            </a:r>
+            <a:r>
+              <a:rPr lang="de-DE" baseline="0" dirty="0" err="1"/>
+              <a:t>Beispielvariblen</a:t>
+            </a:r>
+            <a:r>
+              <a:rPr lang="de-DE" baseline="0" dirty="0"/>
+              <a:t> und –</a:t>
+            </a:r>
+            <a:r>
+              <a:rPr lang="de-DE" baseline="0" dirty="0" err="1"/>
+              <a:t>funktionen</a:t>
+            </a:r>
+            <a:endParaRPr lang="de-DE" baseline="0" dirty="0"/>
+          </a:p>
+          <a:p>
+            <a:endParaRPr lang="de-DE" baseline="0" dirty="0"/>
+          </a:p>
+          <a:p>
+            <a:r>
+              <a:rPr lang="de-DE" baseline="0" dirty="0"/>
+              <a:t>-wie man hier sieht gibt die Oberklasse Bildschirm den Klassen darunter die Breite und Länge für den Bildschirm</a:t>
+            </a:r>
+          </a:p>
+          <a:p>
+            <a:r>
               <a:rPr lang="de-DE" baseline="0" dirty="0"/>
               <a:t>-“+“ </a:t>
             </a:r>
@@ -1081,12 +1046,6 @@
               <a:rPr lang="de-DE" baseline="0" dirty="0"/>
               <a:t>-“-“private</a:t>
             </a:r>
-          </a:p>
-          <a:p>
-            <a:endParaRPr lang="de-DE" dirty="0"/>
-          </a:p>
-          <a:p>
-            <a:endParaRPr lang="de-DE" dirty="0"/>
           </a:p>
         </p:txBody>
       </p:sp>
@@ -1107,7 +1066,220 @@
           <a:p>
             <a:fld id="{B3718980-F47B-4107-9E31-BBEAA60D0300}" type="slidenum">
               <a:rPr lang="de-DE" smtClean="0"/>
+              <a:t>6</a:t>
+            </a:fld>
+            <a:endParaRPr lang="de-DE"/>
+          </a:p>
+        </p:txBody>
+      </p:sp>
+    </p:spTree>
+    <p:extLst>
+      <p:ext uri="{BB962C8B-B14F-4D97-AF65-F5344CB8AC3E}">
+        <p14:creationId xmlns:p14="http://schemas.microsoft.com/office/powerpoint/2010/main" val="2390111728"/>
+      </p:ext>
+    </p:extLst>
+  </p:cSld>
+  <p:clrMapOvr>
+    <a:masterClrMapping/>
+  </p:clrMapOvr>
+</p:notes>
+</file>
+
+<file path=ppt/notesSlides/notesSlide6.xml><?xml version="1.0" encoding="utf-8"?>
+<p:notes xmlns:a="http://schemas.openxmlformats.org/drawingml/2006/main" xmlns:r="http://schemas.openxmlformats.org/officeDocument/2006/relationships" xmlns:p="http://schemas.openxmlformats.org/presentationml/2006/main">
+  <p:cSld>
+    <p:spTree>
+      <p:nvGrpSpPr>
+        <p:cNvPr id="1" name=""/>
+        <p:cNvGrpSpPr/>
+        <p:nvPr/>
+      </p:nvGrpSpPr>
+      <p:grpSpPr>
+        <a:xfrm>
+          <a:off x="0" y="0"/>
+          <a:ext cx="0" cy="0"/>
+          <a:chOff x="0" y="0"/>
+          <a:chExt cx="0" cy="0"/>
+        </a:xfrm>
+      </p:grpSpPr>
+      <p:sp>
+        <p:nvSpPr>
+          <p:cNvPr id="2" name="Folienbildplatzhalter 1"/>
+          <p:cNvSpPr>
+            <a:spLocks noGrp="1" noRot="1" noChangeAspect="1"/>
+          </p:cNvSpPr>
+          <p:nvPr>
+            <p:ph type="sldImg"/>
+          </p:nvPr>
+        </p:nvSpPr>
+        <p:spPr/>
+      </p:sp>
+      <p:sp>
+        <p:nvSpPr>
+          <p:cNvPr id="3" name="Notizenplatzhalter 2"/>
+          <p:cNvSpPr>
+            <a:spLocks noGrp="1"/>
+          </p:cNvSpPr>
+          <p:nvPr>
+            <p:ph type="body" idx="1"/>
+          </p:nvPr>
+        </p:nvSpPr>
+        <p:spPr/>
+        <p:txBody>
+          <a:bodyPr/>
+          <a:lstStyle/>
+          <a:p>
+            <a:r>
+              <a:rPr lang="de-DE" baseline="0" dirty="0"/>
+              <a:t>-“+“ </a:t>
+            </a:r>
+            <a:r>
+              <a:rPr lang="de-DE" baseline="0" dirty="0" err="1"/>
+              <a:t>public</a:t>
+            </a:r>
+            <a:endParaRPr lang="de-DE" baseline="0" dirty="0"/>
+          </a:p>
+          <a:p>
+            <a:r>
+              <a:rPr lang="de-DE" baseline="0" dirty="0"/>
+              <a:t>-“-“private</a:t>
+            </a:r>
+          </a:p>
+          <a:p>
+            <a:r>
+              <a:rPr lang="de-DE" dirty="0"/>
+              <a:t>-“#“ </a:t>
+            </a:r>
+            <a:r>
+              <a:rPr lang="de-DE" dirty="0" err="1"/>
+              <a:t>protected</a:t>
+            </a:r>
+            <a:endParaRPr lang="de-DE" dirty="0"/>
+          </a:p>
+        </p:txBody>
+      </p:sp>
+      <p:sp>
+        <p:nvSpPr>
+          <p:cNvPr id="4" name="Foliennummernplatzhalter 3"/>
+          <p:cNvSpPr>
+            <a:spLocks noGrp="1"/>
+          </p:cNvSpPr>
+          <p:nvPr>
+            <p:ph type="sldNum" sz="quarter" idx="10"/>
+          </p:nvPr>
+        </p:nvSpPr>
+        <p:spPr/>
+        <p:txBody>
+          <a:bodyPr/>
+          <a:lstStyle/>
+          <a:p>
+            <a:fld id="{B3718980-F47B-4107-9E31-BBEAA60D0300}" type="slidenum">
+              <a:rPr lang="de-DE" smtClean="0"/>
               <a:t>7</a:t>
+            </a:fld>
+            <a:endParaRPr lang="de-DE"/>
+          </a:p>
+        </p:txBody>
+      </p:sp>
+    </p:spTree>
+    <p:extLst>
+      <p:ext uri="{BB962C8B-B14F-4D97-AF65-F5344CB8AC3E}">
+        <p14:creationId xmlns:p14="http://schemas.microsoft.com/office/powerpoint/2010/main" val="1459809751"/>
+      </p:ext>
+    </p:extLst>
+  </p:cSld>
+  <p:clrMapOvr>
+    <a:masterClrMapping/>
+  </p:clrMapOvr>
+</p:notes>
+</file>
+
+<file path=ppt/notesSlides/notesSlide7.xml><?xml version="1.0" encoding="utf-8"?>
+<p:notes xmlns:a="http://schemas.openxmlformats.org/drawingml/2006/main" xmlns:r="http://schemas.openxmlformats.org/officeDocument/2006/relationships" xmlns:p="http://schemas.openxmlformats.org/presentationml/2006/main">
+  <p:cSld>
+    <p:spTree>
+      <p:nvGrpSpPr>
+        <p:cNvPr id="1" name=""/>
+        <p:cNvGrpSpPr/>
+        <p:nvPr/>
+      </p:nvGrpSpPr>
+      <p:grpSpPr>
+        <a:xfrm>
+          <a:off x="0" y="0"/>
+          <a:ext cx="0" cy="0"/>
+          <a:chOff x="0" y="0"/>
+          <a:chExt cx="0" cy="0"/>
+        </a:xfrm>
+      </p:grpSpPr>
+      <p:sp>
+        <p:nvSpPr>
+          <p:cNvPr id="2" name="Folienbildplatzhalter 1"/>
+          <p:cNvSpPr>
+            <a:spLocks noGrp="1" noRot="1" noChangeAspect="1"/>
+          </p:cNvSpPr>
+          <p:nvPr>
+            <p:ph type="sldImg"/>
+          </p:nvPr>
+        </p:nvSpPr>
+        <p:spPr/>
+      </p:sp>
+      <p:sp>
+        <p:nvSpPr>
+          <p:cNvPr id="3" name="Notizenplatzhalter 2"/>
+          <p:cNvSpPr>
+            <a:spLocks noGrp="1"/>
+          </p:cNvSpPr>
+          <p:nvPr>
+            <p:ph type="body" idx="1"/>
+          </p:nvPr>
+        </p:nvSpPr>
+        <p:spPr/>
+        <p:txBody>
+          <a:bodyPr/>
+          <a:lstStyle/>
+          <a:p>
+            <a:r>
+              <a:rPr lang="de-DE" baseline="0" dirty="0"/>
+              <a:t>-“+“ </a:t>
+            </a:r>
+            <a:r>
+              <a:rPr lang="de-DE" baseline="0" dirty="0" err="1"/>
+              <a:t>public</a:t>
+            </a:r>
+            <a:endParaRPr lang="de-DE" baseline="0" dirty="0"/>
+          </a:p>
+          <a:p>
+            <a:r>
+              <a:rPr lang="de-DE" baseline="0" dirty="0"/>
+              <a:t>-“-“private</a:t>
+            </a:r>
+          </a:p>
+          <a:p>
+            <a:endParaRPr lang="de-DE" dirty="0"/>
+          </a:p>
+          <a:p>
+            <a:endParaRPr lang="de-DE" dirty="0"/>
+          </a:p>
+        </p:txBody>
+      </p:sp>
+      <p:sp>
+        <p:nvSpPr>
+          <p:cNvPr id="4" name="Foliennummernplatzhalter 3"/>
+          <p:cNvSpPr>
+            <a:spLocks noGrp="1"/>
+          </p:cNvSpPr>
+          <p:nvPr>
+            <p:ph type="sldNum" sz="quarter" idx="10"/>
+          </p:nvPr>
+        </p:nvSpPr>
+        <p:spPr/>
+        <p:txBody>
+          <a:bodyPr/>
+          <a:lstStyle/>
+          <a:p>
+            <a:fld id="{B3718980-F47B-4107-9E31-BBEAA60D0300}" type="slidenum">
+              <a:rPr lang="de-DE" smtClean="0"/>
+              <a:t>8</a:t>
             </a:fld>
             <a:endParaRPr lang="de-DE"/>
           </a:p>
@@ -3971,7 +4143,7 @@
           <p:nvPr/>
         </p:nvPicPr>
         <p:blipFill>
-          <a:blip r:embed="rId2"/>
+          <a:blip r:embed="rId3"/>
           <a:stretch>
             <a:fillRect/>
           </a:stretch>
@@ -4002,12 +4174,20 @@
           <a:lstStyle/>
           <a:p>
             <a:r>
+              <a:rPr lang="de-DE" dirty="0">
+                <a:solidFill>
+                  <a:schemeClr val="bg1"/>
+                </a:solidFill>
+              </a:rPr>
+              <a:t>Hole in </a:t>
+            </a:r>
+            <a:r>
               <a:rPr lang="de-DE" dirty="0" err="1">
                 <a:solidFill>
                   <a:schemeClr val="bg1"/>
                 </a:solidFill>
               </a:rPr>
-              <a:t>Ball&amp;Fall</a:t>
+              <a:t>One</a:t>
             </a:r>
             <a:endParaRPr lang="de-DE" dirty="0">
               <a:solidFill>
@@ -4038,7 +4218,7 @@
                   <a:schemeClr val="bg1"/>
                 </a:solidFill>
               </a:rPr>
-              <a:t>Von Viktoria, Florian, Alexander, Jonas und Maximilian</a:t>
+              <a:t>Von Victoria, Florian, Alexander, Jonas und Maximilian</a:t>
             </a:r>
           </a:p>
         </p:txBody>
@@ -4047,6 +4227,2212 @@
     <p:extLst>
       <p:ext uri="{BB962C8B-B14F-4D97-AF65-F5344CB8AC3E}">
         <p14:creationId xmlns:p14="http://schemas.microsoft.com/office/powerpoint/2010/main" val="1379654237"/>
+      </p:ext>
+    </p:extLst>
+  </p:cSld>
+  <p:clrMapOvr>
+    <a:masterClrMapping/>
+  </p:clrMapOvr>
+</p:sld>
+</file>
+
+<file path=ppt/slides/slide10.xml><?xml version="1.0" encoding="utf-8"?>
+<p:sld xmlns:a="http://schemas.openxmlformats.org/drawingml/2006/main" xmlns:r="http://schemas.openxmlformats.org/officeDocument/2006/relationships" xmlns:p="http://schemas.openxmlformats.org/presentationml/2006/main" show="0">
+  <p:cSld>
+    <p:spTree>
+      <p:nvGrpSpPr>
+        <p:cNvPr id="1" name=""/>
+        <p:cNvGrpSpPr/>
+        <p:nvPr/>
+      </p:nvGrpSpPr>
+      <p:grpSpPr>
+        <a:xfrm>
+          <a:off x="0" y="0"/>
+          <a:ext cx="0" cy="0"/>
+          <a:chOff x="0" y="0"/>
+          <a:chExt cx="0" cy="0"/>
+        </a:xfrm>
+      </p:grpSpPr>
+      <p:sp>
+        <p:nvSpPr>
+          <p:cNvPr id="2" name="Titel 1"/>
+          <p:cNvSpPr>
+            <a:spLocks noGrp="1"/>
+          </p:cNvSpPr>
+          <p:nvPr>
+            <p:ph type="ctrTitle"/>
+          </p:nvPr>
+        </p:nvSpPr>
+        <p:spPr/>
+        <p:txBody>
+          <a:bodyPr/>
+          <a:lstStyle/>
+          <a:p>
+            <a:endParaRPr lang="en-US"/>
+          </a:p>
+        </p:txBody>
+      </p:sp>
+      <p:sp>
+        <p:nvSpPr>
+          <p:cNvPr id="3" name="Untertitel 2"/>
+          <p:cNvSpPr>
+            <a:spLocks noGrp="1"/>
+          </p:cNvSpPr>
+          <p:nvPr>
+            <p:ph type="subTitle" idx="1"/>
+          </p:nvPr>
+        </p:nvSpPr>
+        <p:spPr/>
+        <p:txBody>
+          <a:bodyPr/>
+          <a:lstStyle/>
+          <a:p>
+            <a:endParaRPr lang="en-US"/>
+          </a:p>
+        </p:txBody>
+      </p:sp>
+      <p:pic>
+        <p:nvPicPr>
+          <p:cNvPr id="4" name="Grafik 3"/>
+          <p:cNvPicPr>
+            <a:picLocks noChangeAspect="1"/>
+          </p:cNvPicPr>
+          <p:nvPr/>
+        </p:nvPicPr>
+        <p:blipFill>
+          <a:blip r:embed="rId2">
+            <a:extLst>
+              <a:ext uri="{28A0092B-C50C-407E-A947-70E740481C1C}">
+                <a14:useLocalDpi xmlns:a14="http://schemas.microsoft.com/office/drawing/2010/main" val="0"/>
+              </a:ext>
+            </a:extLst>
+          </a:blip>
+          <a:stretch>
+            <a:fillRect/>
+          </a:stretch>
+        </p:blipFill>
+        <p:spPr>
+          <a:xfrm>
+            <a:off x="0" y="1097"/>
+            <a:ext cx="12192000" cy="6856903"/>
+          </a:xfrm>
+          <a:prstGeom prst="rect">
+            <a:avLst/>
+          </a:prstGeom>
+        </p:spPr>
+      </p:pic>
+      <p:sp>
+        <p:nvSpPr>
+          <p:cNvPr id="5" name="Rechteck 4"/>
+          <p:cNvSpPr/>
+          <p:nvPr/>
+        </p:nvSpPr>
+        <p:spPr>
+          <a:xfrm>
+            <a:off x="3775494" y="2233635"/>
+            <a:ext cx="4641011" cy="2398143"/>
+          </a:xfrm>
+          <a:prstGeom prst="rect">
+            <a:avLst/>
+          </a:prstGeom>
+          <a:solidFill>
+            <a:schemeClr val="accent3">
+              <a:alpha val="75000"/>
+            </a:schemeClr>
+          </a:solidFill>
+          <a:ln>
+            <a:noFill/>
+          </a:ln>
+        </p:spPr>
+        <p:style>
+          <a:lnRef idx="0">
+            <a:scrgbClr r="0" g="0" b="0"/>
+          </a:lnRef>
+          <a:fillRef idx="0">
+            <a:scrgbClr r="0" g="0" b="0"/>
+          </a:fillRef>
+          <a:effectRef idx="0">
+            <a:scrgbClr r="0" g="0" b="0"/>
+          </a:effectRef>
+          <a:fontRef idx="minor">
+            <a:schemeClr val="lt1"/>
+          </a:fontRef>
+        </p:style>
+        <p:txBody>
+          <a:bodyPr rtlCol="0" anchor="t"/>
+          <a:lstStyle/>
+          <a:p>
+            <a:r>
+              <a:rPr lang="de-DE" dirty="0"/>
+              <a:t>Menü</a:t>
+            </a:r>
+            <a:br>
+              <a:rPr lang="de-DE" dirty="0"/>
+            </a:br>
+            <a:br>
+              <a:rPr lang="de-DE" dirty="0"/>
+            </a:br>
+            <a:r>
+              <a:rPr lang="de-DE" dirty="0" err="1"/>
+              <a:t>Levelauswahl</a:t>
+            </a:r>
+            <a:endParaRPr lang="de-DE" dirty="0"/>
+          </a:p>
+          <a:p>
+            <a:r>
+              <a:rPr lang="de-DE" dirty="0"/>
+              <a:t>Spielstand speichern</a:t>
+            </a:r>
+          </a:p>
+          <a:p>
+            <a:r>
+              <a:rPr lang="de-DE" dirty="0"/>
+              <a:t>Spielstand laden</a:t>
+            </a:r>
+          </a:p>
+          <a:p>
+            <a:r>
+              <a:rPr lang="de-DE" dirty="0" err="1"/>
+              <a:t>Highscore</a:t>
+            </a:r>
+            <a:endParaRPr lang="de-DE" dirty="0"/>
+          </a:p>
+          <a:p>
+            <a:r>
+              <a:rPr lang="de-DE" dirty="0" err="1"/>
+              <a:t>Credits</a:t>
+            </a:r>
+            <a:endParaRPr lang="en-US" dirty="0"/>
+          </a:p>
+        </p:txBody>
+      </p:sp>
+      <p:sp>
+        <p:nvSpPr>
+          <p:cNvPr id="6" name="Interaktive Schaltfläche: Sound 5">
+            <a:hlinkClick r:id="" action="ppaction://noaction" highlightClick="1">
+              <a:snd r:embed="rId3" name="applause.wav"/>
+            </a:hlinkClick>
+          </p:cNvPr>
+          <p:cNvSpPr/>
+          <p:nvPr/>
+        </p:nvSpPr>
+        <p:spPr>
+          <a:xfrm>
+            <a:off x="8082952" y="4311178"/>
+            <a:ext cx="241538" cy="237481"/>
+          </a:xfrm>
+          <a:prstGeom prst="actionButtonSound">
+            <a:avLst/>
+          </a:prstGeom>
+          <a:solidFill>
+            <a:schemeClr val="bg1"/>
+          </a:solidFill>
+        </p:spPr>
+        <p:style>
+          <a:lnRef idx="2">
+            <a:schemeClr val="accent1">
+              <a:shade val="50000"/>
+            </a:schemeClr>
+          </a:lnRef>
+          <a:fillRef idx="1">
+            <a:schemeClr val="accent1"/>
+          </a:fillRef>
+          <a:effectRef idx="0">
+            <a:schemeClr val="accent1"/>
+          </a:effectRef>
+          <a:fontRef idx="minor">
+            <a:schemeClr val="lt1"/>
+          </a:fontRef>
+        </p:style>
+        <p:txBody>
+          <a:bodyPr rtlCol="0" anchor="ctr"/>
+          <a:lstStyle/>
+          <a:p>
+            <a:pPr algn="ctr"/>
+            <a:endParaRPr lang="en-US"/>
+          </a:p>
+        </p:txBody>
+      </p:sp>
+    </p:spTree>
+    <p:extLst>
+      <p:ext uri="{BB962C8B-B14F-4D97-AF65-F5344CB8AC3E}">
+        <p14:creationId xmlns:p14="http://schemas.microsoft.com/office/powerpoint/2010/main" val="1916738138"/>
+      </p:ext>
+    </p:extLst>
+  </p:cSld>
+  <p:clrMapOvr>
+    <a:masterClrMapping/>
+  </p:clrMapOvr>
+</p:sld>
+</file>
+
+<file path=ppt/slides/slide11.xml><?xml version="1.0" encoding="utf-8"?>
+<p:sld xmlns:a="http://schemas.openxmlformats.org/drawingml/2006/main" xmlns:r="http://schemas.openxmlformats.org/officeDocument/2006/relationships" xmlns:p="http://schemas.openxmlformats.org/presentationml/2006/main" show="0">
+  <p:cSld>
+    <p:spTree>
+      <p:nvGrpSpPr>
+        <p:cNvPr id="1" name=""/>
+        <p:cNvGrpSpPr/>
+        <p:nvPr/>
+      </p:nvGrpSpPr>
+      <p:grpSpPr>
+        <a:xfrm>
+          <a:off x="0" y="0"/>
+          <a:ext cx="0" cy="0"/>
+          <a:chOff x="0" y="0"/>
+          <a:chExt cx="0" cy="0"/>
+        </a:xfrm>
+      </p:grpSpPr>
+      <p:sp>
+        <p:nvSpPr>
+          <p:cNvPr id="2" name="Titel 1"/>
+          <p:cNvSpPr>
+            <a:spLocks noGrp="1"/>
+          </p:cNvSpPr>
+          <p:nvPr>
+            <p:ph type="ctrTitle"/>
+          </p:nvPr>
+        </p:nvSpPr>
+        <p:spPr/>
+        <p:txBody>
+          <a:bodyPr/>
+          <a:lstStyle/>
+          <a:p>
+            <a:endParaRPr lang="en-US"/>
+          </a:p>
+        </p:txBody>
+      </p:sp>
+      <p:sp>
+        <p:nvSpPr>
+          <p:cNvPr id="3" name="Untertitel 2"/>
+          <p:cNvSpPr>
+            <a:spLocks noGrp="1"/>
+          </p:cNvSpPr>
+          <p:nvPr>
+            <p:ph type="subTitle" idx="1"/>
+          </p:nvPr>
+        </p:nvSpPr>
+        <p:spPr/>
+        <p:txBody>
+          <a:bodyPr/>
+          <a:lstStyle/>
+          <a:p>
+            <a:endParaRPr lang="en-US"/>
+          </a:p>
+        </p:txBody>
+      </p:sp>
+      <p:pic>
+        <p:nvPicPr>
+          <p:cNvPr id="4" name="Grafik 3"/>
+          <p:cNvPicPr>
+            <a:picLocks noChangeAspect="1"/>
+          </p:cNvPicPr>
+          <p:nvPr/>
+        </p:nvPicPr>
+        <p:blipFill>
+          <a:blip r:embed="rId2">
+            <a:extLst>
+              <a:ext uri="{28A0092B-C50C-407E-A947-70E740481C1C}">
+                <a14:useLocalDpi xmlns:a14="http://schemas.microsoft.com/office/drawing/2010/main" val="0"/>
+              </a:ext>
+            </a:extLst>
+          </a:blip>
+          <a:stretch>
+            <a:fillRect/>
+          </a:stretch>
+        </p:blipFill>
+        <p:spPr>
+          <a:xfrm>
+            <a:off x="0" y="0"/>
+            <a:ext cx="12192000" cy="6856903"/>
+          </a:xfrm>
+          <a:prstGeom prst="rect">
+            <a:avLst/>
+          </a:prstGeom>
+        </p:spPr>
+      </p:pic>
+      <p:sp>
+        <p:nvSpPr>
+          <p:cNvPr id="5" name="Rechteck 4"/>
+          <p:cNvSpPr/>
+          <p:nvPr/>
+        </p:nvSpPr>
+        <p:spPr>
+          <a:xfrm>
+            <a:off x="2143664" y="1453247"/>
+            <a:ext cx="7904672" cy="3951504"/>
+          </a:xfrm>
+          <a:prstGeom prst="rect">
+            <a:avLst/>
+          </a:prstGeom>
+          <a:solidFill>
+            <a:schemeClr val="accent3">
+              <a:alpha val="75000"/>
+            </a:schemeClr>
+          </a:solidFill>
+          <a:ln>
+            <a:noFill/>
+          </a:ln>
+        </p:spPr>
+        <p:style>
+          <a:lnRef idx="0">
+            <a:scrgbClr r="0" g="0" b="0"/>
+          </a:lnRef>
+          <a:fillRef idx="0">
+            <a:scrgbClr r="0" g="0" b="0"/>
+          </a:fillRef>
+          <a:effectRef idx="0">
+            <a:scrgbClr r="0" g="0" b="0"/>
+          </a:effectRef>
+          <a:fontRef idx="minor">
+            <a:schemeClr val="lt1"/>
+          </a:fontRef>
+        </p:style>
+        <p:txBody>
+          <a:bodyPr rtlCol="0" anchor="t"/>
+          <a:lstStyle/>
+          <a:p>
+            <a:r>
+              <a:rPr lang="de-DE" dirty="0" err="1"/>
+              <a:t>Levelauswahl</a:t>
+            </a:r>
+            <a:endParaRPr lang="en-US" dirty="0"/>
+          </a:p>
+        </p:txBody>
+      </p:sp>
+      <p:sp>
+        <p:nvSpPr>
+          <p:cNvPr id="7" name="Abgerundetes Rechteck 6"/>
+          <p:cNvSpPr/>
+          <p:nvPr/>
+        </p:nvSpPr>
+        <p:spPr>
+          <a:xfrm>
+            <a:off x="2605178" y="1940944"/>
+            <a:ext cx="819509" cy="785003"/>
+          </a:xfrm>
+          <a:prstGeom prst="roundRect">
+            <a:avLst/>
+          </a:prstGeom>
+        </p:spPr>
+        <p:style>
+          <a:lnRef idx="2">
+            <a:schemeClr val="accent6">
+              <a:shade val="50000"/>
+            </a:schemeClr>
+          </a:lnRef>
+          <a:fillRef idx="1">
+            <a:schemeClr val="accent6"/>
+          </a:fillRef>
+          <a:effectRef idx="0">
+            <a:schemeClr val="accent6"/>
+          </a:effectRef>
+          <a:fontRef idx="minor">
+            <a:schemeClr val="lt1"/>
+          </a:fontRef>
+        </p:style>
+        <p:txBody>
+          <a:bodyPr rtlCol="0" anchor="ctr"/>
+          <a:lstStyle/>
+          <a:p>
+            <a:pPr algn="ctr"/>
+            <a:r>
+              <a:rPr lang="de-DE" sz="3200" dirty="0"/>
+              <a:t>1</a:t>
+            </a:r>
+            <a:endParaRPr lang="en-US" dirty="0"/>
+          </a:p>
+        </p:txBody>
+      </p:sp>
+      <p:sp>
+        <p:nvSpPr>
+          <p:cNvPr id="8" name="Abgerundetes Rechteck 7"/>
+          <p:cNvSpPr/>
+          <p:nvPr/>
+        </p:nvSpPr>
+        <p:spPr>
+          <a:xfrm>
+            <a:off x="4679829" y="1940943"/>
+            <a:ext cx="819509" cy="785003"/>
+          </a:xfrm>
+          <a:prstGeom prst="roundRect">
+            <a:avLst/>
+          </a:prstGeom>
+        </p:spPr>
+        <p:style>
+          <a:lnRef idx="2">
+            <a:schemeClr val="accent6">
+              <a:shade val="50000"/>
+            </a:schemeClr>
+          </a:lnRef>
+          <a:fillRef idx="1">
+            <a:schemeClr val="accent6"/>
+          </a:fillRef>
+          <a:effectRef idx="0">
+            <a:schemeClr val="accent6"/>
+          </a:effectRef>
+          <a:fontRef idx="minor">
+            <a:schemeClr val="lt1"/>
+          </a:fontRef>
+        </p:style>
+        <p:txBody>
+          <a:bodyPr rtlCol="0" anchor="ctr"/>
+          <a:lstStyle/>
+          <a:p>
+            <a:pPr algn="ctr"/>
+            <a:r>
+              <a:rPr lang="de-DE" sz="3200" dirty="0"/>
+              <a:t>3</a:t>
+            </a:r>
+            <a:endParaRPr lang="en-US" dirty="0"/>
+          </a:p>
+        </p:txBody>
+      </p:sp>
+      <p:sp>
+        <p:nvSpPr>
+          <p:cNvPr id="9" name="Abgerundetes Rechteck 8"/>
+          <p:cNvSpPr/>
+          <p:nvPr/>
+        </p:nvSpPr>
+        <p:spPr>
+          <a:xfrm>
+            <a:off x="5717154" y="1940942"/>
+            <a:ext cx="819509" cy="785003"/>
+          </a:xfrm>
+          <a:prstGeom prst="roundRect">
+            <a:avLst/>
+          </a:prstGeom>
+        </p:spPr>
+        <p:style>
+          <a:lnRef idx="2">
+            <a:schemeClr val="accent6">
+              <a:shade val="50000"/>
+            </a:schemeClr>
+          </a:lnRef>
+          <a:fillRef idx="1">
+            <a:schemeClr val="accent6"/>
+          </a:fillRef>
+          <a:effectRef idx="0">
+            <a:schemeClr val="accent6"/>
+          </a:effectRef>
+          <a:fontRef idx="minor">
+            <a:schemeClr val="lt1"/>
+          </a:fontRef>
+        </p:style>
+        <p:txBody>
+          <a:bodyPr rtlCol="0" anchor="ctr"/>
+          <a:lstStyle/>
+          <a:p>
+            <a:pPr algn="ctr"/>
+            <a:r>
+              <a:rPr lang="de-DE" sz="3200" dirty="0"/>
+              <a:t>4</a:t>
+            </a:r>
+            <a:endParaRPr lang="en-US" dirty="0"/>
+          </a:p>
+        </p:txBody>
+      </p:sp>
+      <p:sp>
+        <p:nvSpPr>
+          <p:cNvPr id="10" name="Abgerundetes Rechteck 9"/>
+          <p:cNvSpPr/>
+          <p:nvPr/>
+        </p:nvSpPr>
+        <p:spPr>
+          <a:xfrm>
+            <a:off x="3642503" y="1940942"/>
+            <a:ext cx="819509" cy="785003"/>
+          </a:xfrm>
+          <a:prstGeom prst="roundRect">
+            <a:avLst/>
+          </a:prstGeom>
+        </p:spPr>
+        <p:style>
+          <a:lnRef idx="2">
+            <a:schemeClr val="accent6">
+              <a:shade val="50000"/>
+            </a:schemeClr>
+          </a:lnRef>
+          <a:fillRef idx="1">
+            <a:schemeClr val="accent6"/>
+          </a:fillRef>
+          <a:effectRef idx="0">
+            <a:schemeClr val="accent6"/>
+          </a:effectRef>
+          <a:fontRef idx="minor">
+            <a:schemeClr val="lt1"/>
+          </a:fontRef>
+        </p:style>
+        <p:txBody>
+          <a:bodyPr rtlCol="0" anchor="ctr"/>
+          <a:lstStyle/>
+          <a:p>
+            <a:pPr algn="ctr"/>
+            <a:r>
+              <a:rPr lang="de-DE" sz="3200" dirty="0"/>
+              <a:t>2</a:t>
+            </a:r>
+            <a:endParaRPr lang="en-US" dirty="0"/>
+          </a:p>
+        </p:txBody>
+      </p:sp>
+    </p:spTree>
+    <p:extLst>
+      <p:ext uri="{BB962C8B-B14F-4D97-AF65-F5344CB8AC3E}">
+        <p14:creationId xmlns:p14="http://schemas.microsoft.com/office/powerpoint/2010/main" val="3093440210"/>
+      </p:ext>
+    </p:extLst>
+  </p:cSld>
+  <p:clrMapOvr>
+    <a:masterClrMapping/>
+  </p:clrMapOvr>
+</p:sld>
+</file>
+
+<file path=ppt/slides/slide12.xml><?xml version="1.0" encoding="utf-8"?>
+<p:sld xmlns:a="http://schemas.openxmlformats.org/drawingml/2006/main" xmlns:r="http://schemas.openxmlformats.org/officeDocument/2006/relationships" xmlns:p="http://schemas.openxmlformats.org/presentationml/2006/main" show="0">
+  <p:cSld>
+    <p:spTree>
+      <p:nvGrpSpPr>
+        <p:cNvPr id="1" name=""/>
+        <p:cNvGrpSpPr/>
+        <p:nvPr/>
+      </p:nvGrpSpPr>
+      <p:grpSpPr>
+        <a:xfrm>
+          <a:off x="0" y="0"/>
+          <a:ext cx="0" cy="0"/>
+          <a:chOff x="0" y="0"/>
+          <a:chExt cx="0" cy="0"/>
+        </a:xfrm>
+      </p:grpSpPr>
+      <p:sp>
+        <p:nvSpPr>
+          <p:cNvPr id="2" name="Titel 1"/>
+          <p:cNvSpPr>
+            <a:spLocks noGrp="1"/>
+          </p:cNvSpPr>
+          <p:nvPr>
+            <p:ph type="ctrTitle"/>
+          </p:nvPr>
+        </p:nvSpPr>
+        <p:spPr/>
+        <p:txBody>
+          <a:bodyPr/>
+          <a:lstStyle/>
+          <a:p>
+            <a:endParaRPr lang="en-US"/>
+          </a:p>
+        </p:txBody>
+      </p:sp>
+      <p:sp>
+        <p:nvSpPr>
+          <p:cNvPr id="3" name="Untertitel 2"/>
+          <p:cNvSpPr>
+            <a:spLocks noGrp="1"/>
+          </p:cNvSpPr>
+          <p:nvPr>
+            <p:ph type="subTitle" idx="1"/>
+          </p:nvPr>
+        </p:nvSpPr>
+        <p:spPr/>
+        <p:txBody>
+          <a:bodyPr/>
+          <a:lstStyle/>
+          <a:p>
+            <a:endParaRPr lang="en-US"/>
+          </a:p>
+        </p:txBody>
+      </p:sp>
+      <p:pic>
+        <p:nvPicPr>
+          <p:cNvPr id="4" name="Grafik 3"/>
+          <p:cNvPicPr>
+            <a:picLocks noChangeAspect="1"/>
+          </p:cNvPicPr>
+          <p:nvPr/>
+        </p:nvPicPr>
+        <p:blipFill rotWithShape="1">
+          <a:blip r:embed="rId2">
+            <a:extLst>
+              <a:ext uri="{28A0092B-C50C-407E-A947-70E740481C1C}">
+                <a14:useLocalDpi xmlns:a14="http://schemas.microsoft.com/office/drawing/2010/main" val="0"/>
+              </a:ext>
+            </a:extLst>
+          </a:blip>
+          <a:srcRect t="12214"/>
+          <a:stretch/>
+        </p:blipFill>
+        <p:spPr>
+          <a:xfrm>
+            <a:off x="0" y="-9525"/>
+            <a:ext cx="12192000" cy="6019342"/>
+          </a:xfrm>
+          <a:prstGeom prst="rect">
+            <a:avLst/>
+          </a:prstGeom>
+        </p:spPr>
+      </p:pic>
+      <p:sp>
+        <p:nvSpPr>
+          <p:cNvPr id="6" name="Rechteck 5"/>
+          <p:cNvSpPr/>
+          <p:nvPr/>
+        </p:nvSpPr>
+        <p:spPr>
+          <a:xfrm>
+            <a:off x="0" y="5255736"/>
+            <a:ext cx="12192000" cy="1599651"/>
+          </a:xfrm>
+          <a:prstGeom prst="rect">
+            <a:avLst/>
+          </a:prstGeom>
+          <a:solidFill>
+            <a:schemeClr val="accent3"/>
+          </a:solidFill>
+          <a:ln>
+            <a:noFill/>
+          </a:ln>
+        </p:spPr>
+        <p:style>
+          <a:lnRef idx="0">
+            <a:scrgbClr r="0" g="0" b="0"/>
+          </a:lnRef>
+          <a:fillRef idx="0">
+            <a:scrgbClr r="0" g="0" b="0"/>
+          </a:fillRef>
+          <a:effectRef idx="0">
+            <a:scrgbClr r="0" g="0" b="0"/>
+          </a:effectRef>
+          <a:fontRef idx="minor">
+            <a:schemeClr val="lt1"/>
+          </a:fontRef>
+        </p:style>
+        <p:txBody>
+          <a:bodyPr rtlCol="0" anchor="ctr"/>
+          <a:lstStyle/>
+          <a:p>
+            <a:pPr algn="ctr"/>
+            <a:endParaRPr lang="en-US" dirty="0"/>
+          </a:p>
+        </p:txBody>
+      </p:sp>
+      <p:sp>
+        <p:nvSpPr>
+          <p:cNvPr id="11" name="Rechteck 10"/>
+          <p:cNvSpPr/>
+          <p:nvPr/>
+        </p:nvSpPr>
+        <p:spPr>
+          <a:xfrm>
+            <a:off x="0" y="4875363"/>
+            <a:ext cx="12192000" cy="382438"/>
+          </a:xfrm>
+          <a:prstGeom prst="rect">
+            <a:avLst/>
+          </a:prstGeom>
+          <a:solidFill>
+            <a:schemeClr val="accent6"/>
+          </a:solidFill>
+          <a:ln>
+            <a:noFill/>
+          </a:ln>
+        </p:spPr>
+        <p:style>
+          <a:lnRef idx="0">
+            <a:scrgbClr r="0" g="0" b="0"/>
+          </a:lnRef>
+          <a:fillRef idx="0">
+            <a:scrgbClr r="0" g="0" b="0"/>
+          </a:fillRef>
+          <a:effectRef idx="0">
+            <a:scrgbClr r="0" g="0" b="0"/>
+          </a:effectRef>
+          <a:fontRef idx="minor">
+            <a:schemeClr val="lt1"/>
+          </a:fontRef>
+        </p:style>
+        <p:txBody>
+          <a:bodyPr rtlCol="0" anchor="ctr"/>
+          <a:lstStyle/>
+          <a:p>
+            <a:pPr algn="ctr"/>
+            <a:endParaRPr lang="en-US"/>
+          </a:p>
+        </p:txBody>
+      </p:sp>
+      <p:sp>
+        <p:nvSpPr>
+          <p:cNvPr id="12" name="Rechteck 11"/>
+          <p:cNvSpPr/>
+          <p:nvPr/>
+        </p:nvSpPr>
+        <p:spPr>
+          <a:xfrm>
+            <a:off x="8669547" y="4875363"/>
+            <a:ext cx="310551" cy="274608"/>
+          </a:xfrm>
+          <a:prstGeom prst="rect">
+            <a:avLst/>
+          </a:prstGeom>
+          <a:solidFill>
+            <a:schemeClr val="dk1">
+              <a:alpha val="77000"/>
+            </a:schemeClr>
+          </a:solidFill>
+        </p:spPr>
+        <p:style>
+          <a:lnRef idx="2">
+            <a:schemeClr val="dk1">
+              <a:shade val="50000"/>
+            </a:schemeClr>
+          </a:lnRef>
+          <a:fillRef idx="1">
+            <a:schemeClr val="dk1"/>
+          </a:fillRef>
+          <a:effectRef idx="0">
+            <a:schemeClr val="dk1"/>
+          </a:effectRef>
+          <a:fontRef idx="minor">
+            <a:schemeClr val="lt1"/>
+          </a:fontRef>
+        </p:style>
+        <p:txBody>
+          <a:bodyPr rtlCol="0" anchor="ctr"/>
+          <a:lstStyle/>
+          <a:p>
+            <a:pPr algn="ctr"/>
+            <a:endParaRPr lang="en-US"/>
+          </a:p>
+        </p:txBody>
+      </p:sp>
+      <p:sp>
+        <p:nvSpPr>
+          <p:cNvPr id="13" name="Rechteck 12"/>
+          <p:cNvSpPr/>
+          <p:nvPr/>
+        </p:nvSpPr>
+        <p:spPr>
+          <a:xfrm rot="1516148">
+            <a:off x="997620" y="2188489"/>
+            <a:ext cx="1866181" cy="73324"/>
+          </a:xfrm>
+          <a:prstGeom prst="rect">
+            <a:avLst/>
+          </a:prstGeom>
+          <a:solidFill>
+            <a:srgbClr val="95692F"/>
+          </a:solidFill>
+        </p:spPr>
+        <p:style>
+          <a:lnRef idx="2">
+            <a:schemeClr val="dk1">
+              <a:shade val="50000"/>
+            </a:schemeClr>
+          </a:lnRef>
+          <a:fillRef idx="1">
+            <a:schemeClr val="dk1"/>
+          </a:fillRef>
+          <a:effectRef idx="0">
+            <a:schemeClr val="dk1"/>
+          </a:effectRef>
+          <a:fontRef idx="minor">
+            <a:schemeClr val="lt1"/>
+          </a:fontRef>
+        </p:style>
+        <p:txBody>
+          <a:bodyPr rtlCol="0" anchor="ctr"/>
+          <a:lstStyle/>
+          <a:p>
+            <a:pPr algn="ctr"/>
+            <a:endParaRPr lang="en-US"/>
+          </a:p>
+        </p:txBody>
+      </p:sp>
+      <p:sp>
+        <p:nvSpPr>
+          <p:cNvPr id="15" name="Abgerundetes Rechteck 14"/>
+          <p:cNvSpPr/>
+          <p:nvPr/>
+        </p:nvSpPr>
+        <p:spPr>
+          <a:xfrm>
+            <a:off x="267419" y="5408762"/>
+            <a:ext cx="4095031" cy="1242204"/>
+          </a:xfrm>
+          <a:prstGeom prst="roundRect">
+            <a:avLst/>
+          </a:prstGeom>
+          <a:solidFill>
+            <a:srgbClr val="95692F">
+              <a:alpha val="74000"/>
+            </a:srgbClr>
+          </a:solidFill>
+          <a:ln>
+            <a:noFill/>
+          </a:ln>
+        </p:spPr>
+        <p:style>
+          <a:lnRef idx="2">
+            <a:schemeClr val="accent1">
+              <a:shade val="50000"/>
+            </a:schemeClr>
+          </a:lnRef>
+          <a:fillRef idx="1">
+            <a:schemeClr val="accent1"/>
+          </a:fillRef>
+          <a:effectRef idx="0">
+            <a:schemeClr val="accent1"/>
+          </a:effectRef>
+          <a:fontRef idx="minor">
+            <a:schemeClr val="lt1"/>
+          </a:fontRef>
+        </p:style>
+        <p:txBody>
+          <a:bodyPr rtlCol="0" anchor="t"/>
+          <a:lstStyle/>
+          <a:p>
+            <a:r>
+              <a:rPr lang="de-DE" dirty="0"/>
+              <a:t>Tools</a:t>
+            </a:r>
+            <a:endParaRPr lang="en-US" dirty="0"/>
+          </a:p>
+        </p:txBody>
+      </p:sp>
+      <p:sp>
+        <p:nvSpPr>
+          <p:cNvPr id="16" name="Gleichschenkliges Dreieck 15"/>
+          <p:cNvSpPr/>
+          <p:nvPr/>
+        </p:nvSpPr>
+        <p:spPr>
+          <a:xfrm rot="19663860">
+            <a:off x="4327067" y="3744411"/>
+            <a:ext cx="715992" cy="574245"/>
+          </a:xfrm>
+          <a:prstGeom prst="triangle">
+            <a:avLst/>
+          </a:prstGeom>
+          <a:solidFill>
+            <a:schemeClr val="accent4">
+              <a:lumMod val="50000"/>
+            </a:schemeClr>
+          </a:solidFill>
+          <a:ln>
+            <a:solidFill>
+              <a:schemeClr val="tx1"/>
+            </a:solidFill>
+          </a:ln>
+        </p:spPr>
+        <p:style>
+          <a:lnRef idx="2">
+            <a:schemeClr val="accent1">
+              <a:shade val="50000"/>
+            </a:schemeClr>
+          </a:lnRef>
+          <a:fillRef idx="1">
+            <a:schemeClr val="accent1"/>
+          </a:fillRef>
+          <a:effectRef idx="0">
+            <a:schemeClr val="accent1"/>
+          </a:effectRef>
+          <a:fontRef idx="minor">
+            <a:schemeClr val="lt1"/>
+          </a:fontRef>
+        </p:style>
+        <p:txBody>
+          <a:bodyPr rtlCol="0" anchor="ctr"/>
+          <a:lstStyle/>
+          <a:p>
+            <a:pPr algn="ctr"/>
+            <a:endParaRPr lang="en-US"/>
+          </a:p>
+        </p:txBody>
+      </p:sp>
+      <p:sp>
+        <p:nvSpPr>
+          <p:cNvPr id="17" name="Ellipse 16"/>
+          <p:cNvSpPr/>
+          <p:nvPr/>
+        </p:nvSpPr>
+        <p:spPr>
+          <a:xfrm>
+            <a:off x="1408712" y="5786192"/>
+            <a:ext cx="628291" cy="626641"/>
+          </a:xfrm>
+          <a:prstGeom prst="ellipse">
+            <a:avLst/>
+          </a:prstGeom>
+          <a:solidFill>
+            <a:schemeClr val="accent4">
+              <a:lumMod val="50000"/>
+            </a:schemeClr>
+          </a:solidFill>
+          <a:ln>
+            <a:solidFill>
+              <a:schemeClr val="tx1"/>
+            </a:solidFill>
+          </a:ln>
+        </p:spPr>
+        <p:style>
+          <a:lnRef idx="2">
+            <a:schemeClr val="accent1">
+              <a:shade val="50000"/>
+            </a:schemeClr>
+          </a:lnRef>
+          <a:fillRef idx="1">
+            <a:schemeClr val="accent1"/>
+          </a:fillRef>
+          <a:effectRef idx="0">
+            <a:schemeClr val="accent1"/>
+          </a:effectRef>
+          <a:fontRef idx="minor">
+            <a:schemeClr val="lt1"/>
+          </a:fontRef>
+        </p:style>
+        <p:txBody>
+          <a:bodyPr rtlCol="0" anchor="ctr"/>
+          <a:lstStyle/>
+          <a:p>
+            <a:pPr algn="ctr"/>
+            <a:endParaRPr lang="en-US"/>
+          </a:p>
+        </p:txBody>
+      </p:sp>
+      <p:sp>
+        <p:nvSpPr>
+          <p:cNvPr id="18" name="Rechteck 17"/>
+          <p:cNvSpPr/>
+          <p:nvPr/>
+        </p:nvSpPr>
+        <p:spPr>
+          <a:xfrm>
+            <a:off x="3801891" y="3766285"/>
+            <a:ext cx="681486" cy="600444"/>
+          </a:xfrm>
+          <a:prstGeom prst="rect">
+            <a:avLst/>
+          </a:prstGeom>
+          <a:solidFill>
+            <a:schemeClr val="accent4">
+              <a:lumMod val="50000"/>
+            </a:schemeClr>
+          </a:solidFill>
+          <a:ln>
+            <a:solidFill>
+              <a:schemeClr val="tx1"/>
+            </a:solidFill>
+          </a:ln>
+        </p:spPr>
+        <p:style>
+          <a:lnRef idx="2">
+            <a:schemeClr val="accent1">
+              <a:shade val="50000"/>
+            </a:schemeClr>
+          </a:lnRef>
+          <a:fillRef idx="1">
+            <a:schemeClr val="accent1"/>
+          </a:fillRef>
+          <a:effectRef idx="0">
+            <a:schemeClr val="accent1"/>
+          </a:effectRef>
+          <a:fontRef idx="minor">
+            <a:schemeClr val="lt1"/>
+          </a:fontRef>
+        </p:style>
+        <p:txBody>
+          <a:bodyPr rtlCol="0" anchor="ctr"/>
+          <a:lstStyle/>
+          <a:p>
+            <a:pPr algn="ctr"/>
+            <a:endParaRPr lang="en-US"/>
+          </a:p>
+        </p:txBody>
+      </p:sp>
+      <p:cxnSp>
+        <p:nvCxnSpPr>
+          <p:cNvPr id="20" name="Gerader Verbinder 19"/>
+          <p:cNvCxnSpPr/>
+          <p:nvPr/>
+        </p:nvCxnSpPr>
+        <p:spPr>
+          <a:xfrm>
+            <a:off x="3247352" y="5780141"/>
+            <a:ext cx="733246" cy="574245"/>
+          </a:xfrm>
+          <a:prstGeom prst="line">
+            <a:avLst/>
+          </a:prstGeom>
+          <a:ln w="19050" cap="rnd">
+            <a:solidFill>
+              <a:schemeClr val="tx1"/>
+            </a:solidFill>
+            <a:headEnd type="oval"/>
+            <a:tailEnd type="oval"/>
+          </a:ln>
+        </p:spPr>
+        <p:style>
+          <a:lnRef idx="1">
+            <a:schemeClr val="accent1"/>
+          </a:lnRef>
+          <a:fillRef idx="0">
+            <a:schemeClr val="accent1"/>
+          </a:fillRef>
+          <a:effectRef idx="0">
+            <a:schemeClr val="accent1"/>
+          </a:effectRef>
+          <a:fontRef idx="minor">
+            <a:schemeClr val="tx1"/>
+          </a:fontRef>
+        </p:style>
+      </p:cxnSp>
+      <p:sp>
+        <p:nvSpPr>
+          <p:cNvPr id="21" name="Rechteck 20"/>
+          <p:cNvSpPr/>
+          <p:nvPr/>
+        </p:nvSpPr>
+        <p:spPr>
+          <a:xfrm>
+            <a:off x="5895975" y="4874814"/>
+            <a:ext cx="1957207" cy="300222"/>
+          </a:xfrm>
+          <a:prstGeom prst="rect">
+            <a:avLst/>
+          </a:prstGeom>
+        </p:spPr>
+        <p:style>
+          <a:lnRef idx="2">
+            <a:schemeClr val="accent1">
+              <a:shade val="50000"/>
+            </a:schemeClr>
+          </a:lnRef>
+          <a:fillRef idx="1">
+            <a:schemeClr val="accent1"/>
+          </a:fillRef>
+          <a:effectRef idx="0">
+            <a:schemeClr val="accent1"/>
+          </a:effectRef>
+          <a:fontRef idx="minor">
+            <a:schemeClr val="lt1"/>
+          </a:fontRef>
+        </p:style>
+        <p:txBody>
+          <a:bodyPr rtlCol="0" anchor="ctr"/>
+          <a:lstStyle/>
+          <a:p>
+            <a:pPr algn="ctr"/>
+            <a:endParaRPr lang="en-US"/>
+          </a:p>
+        </p:txBody>
+      </p:sp>
+      <p:sp>
+        <p:nvSpPr>
+          <p:cNvPr id="19" name="Ellipse 18"/>
+          <p:cNvSpPr/>
+          <p:nvPr/>
+        </p:nvSpPr>
+        <p:spPr>
+          <a:xfrm>
+            <a:off x="7484673" y="4900733"/>
+            <a:ext cx="250166" cy="249238"/>
+          </a:xfrm>
+          <a:prstGeom prst="ellipse">
+            <a:avLst/>
+          </a:prstGeom>
+          <a:pattFill prst="pct80">
+            <a:fgClr>
+              <a:schemeClr val="lt1"/>
+            </a:fgClr>
+            <a:bgClr>
+              <a:schemeClr val="tx1"/>
+            </a:bgClr>
+          </a:pattFill>
+        </p:spPr>
+        <p:style>
+          <a:lnRef idx="2">
+            <a:schemeClr val="dk1"/>
+          </a:lnRef>
+          <a:fillRef idx="1">
+            <a:schemeClr val="lt1"/>
+          </a:fillRef>
+          <a:effectRef idx="0">
+            <a:schemeClr val="dk1"/>
+          </a:effectRef>
+          <a:fontRef idx="minor">
+            <a:schemeClr val="dk1"/>
+          </a:fontRef>
+        </p:style>
+        <p:txBody>
+          <a:bodyPr rtlCol="0" anchor="ctr"/>
+          <a:lstStyle/>
+          <a:p>
+            <a:pPr algn="ctr"/>
+            <a:endParaRPr lang="en-US"/>
+          </a:p>
+        </p:txBody>
+      </p:sp>
+      <p:sp>
+        <p:nvSpPr>
+          <p:cNvPr id="22" name="Rechteck 21"/>
+          <p:cNvSpPr/>
+          <p:nvPr/>
+        </p:nvSpPr>
+        <p:spPr>
+          <a:xfrm>
+            <a:off x="289527" y="4862556"/>
+            <a:ext cx="2768675" cy="176088"/>
+          </a:xfrm>
+          <a:prstGeom prst="rect">
+            <a:avLst/>
+          </a:prstGeom>
+          <a:solidFill>
+            <a:schemeClr val="accent4">
+              <a:lumMod val="40000"/>
+              <a:lumOff val="60000"/>
+            </a:schemeClr>
+          </a:solidFill>
+        </p:spPr>
+        <p:style>
+          <a:lnRef idx="2">
+            <a:schemeClr val="accent1">
+              <a:shade val="50000"/>
+            </a:schemeClr>
+          </a:lnRef>
+          <a:fillRef idx="1">
+            <a:schemeClr val="accent1"/>
+          </a:fillRef>
+          <a:effectRef idx="0">
+            <a:schemeClr val="accent1"/>
+          </a:effectRef>
+          <a:fontRef idx="minor">
+            <a:schemeClr val="lt1"/>
+          </a:fontRef>
+        </p:style>
+        <p:txBody>
+          <a:bodyPr rtlCol="0" anchor="ctr"/>
+          <a:lstStyle/>
+          <a:p>
+            <a:pPr algn="ctr"/>
+            <a:endParaRPr lang="en-US"/>
+          </a:p>
+        </p:txBody>
+      </p:sp>
+      <p:sp>
+        <p:nvSpPr>
+          <p:cNvPr id="25" name="Textfeld 24"/>
+          <p:cNvSpPr txBox="1"/>
+          <p:nvPr/>
+        </p:nvSpPr>
+        <p:spPr>
+          <a:xfrm>
+            <a:off x="505246" y="4556880"/>
+            <a:ext cx="2732736" cy="377026"/>
+          </a:xfrm>
+          <a:prstGeom prst="rect">
+            <a:avLst/>
+          </a:prstGeom>
+          <a:noFill/>
+        </p:spPr>
+        <p:txBody>
+          <a:bodyPr wrap="none" rtlCol="0">
+            <a:spAutoFit/>
+          </a:bodyPr>
+          <a:lstStyle/>
+          <a:p>
+            <a:r>
+              <a:rPr lang="de-DE" dirty="0" err="1">
+                <a:solidFill>
+                  <a:schemeClr val="bg1"/>
+                </a:solidFill>
+              </a:rPr>
+              <a:t>Sandbox</a:t>
+            </a:r>
+            <a:r>
+              <a:rPr lang="de-DE" dirty="0">
+                <a:solidFill>
+                  <a:schemeClr val="bg1"/>
+                </a:solidFill>
+              </a:rPr>
+              <a:t> (höhere Reibung)</a:t>
+            </a:r>
+            <a:endParaRPr lang="en-US" dirty="0">
+              <a:solidFill>
+                <a:schemeClr val="bg1"/>
+              </a:solidFill>
+            </a:endParaRPr>
+          </a:p>
+        </p:txBody>
+      </p:sp>
+      <p:sp>
+        <p:nvSpPr>
+          <p:cNvPr id="24" name="Textfeld 23"/>
+          <p:cNvSpPr txBox="1"/>
+          <p:nvPr/>
+        </p:nvSpPr>
+        <p:spPr>
+          <a:xfrm>
+            <a:off x="5909617" y="4561439"/>
+            <a:ext cx="1897443" cy="377026"/>
+          </a:xfrm>
+          <a:prstGeom prst="rect">
+            <a:avLst/>
+          </a:prstGeom>
+          <a:noFill/>
+          <a:ln w="31750">
+            <a:noFill/>
+          </a:ln>
+        </p:spPr>
+        <p:txBody>
+          <a:bodyPr wrap="none" rtlCol="0">
+            <a:spAutoFit/>
+          </a:bodyPr>
+          <a:lstStyle/>
+          <a:p>
+            <a:r>
+              <a:rPr lang="de-DE" sz="1850" dirty="0">
+                <a:solidFill>
+                  <a:schemeClr val="bg1"/>
+                </a:solidFill>
+              </a:rPr>
+              <a:t>Wasser (verloren)</a:t>
+            </a:r>
+            <a:endParaRPr lang="en-US" sz="1850" dirty="0">
+              <a:solidFill>
+                <a:schemeClr val="bg1"/>
+              </a:solidFill>
+            </a:endParaRPr>
+          </a:p>
+        </p:txBody>
+      </p:sp>
+      <p:sp>
+        <p:nvSpPr>
+          <p:cNvPr id="23" name="Textfeld 22"/>
+          <p:cNvSpPr txBox="1"/>
+          <p:nvPr/>
+        </p:nvSpPr>
+        <p:spPr>
+          <a:xfrm>
+            <a:off x="5938066" y="4577080"/>
+            <a:ext cx="1848135" cy="369332"/>
+          </a:xfrm>
+          <a:prstGeom prst="rect">
+            <a:avLst/>
+          </a:prstGeom>
+          <a:noFill/>
+          <a:ln w="31750">
+            <a:noFill/>
+          </a:ln>
+        </p:spPr>
+        <p:txBody>
+          <a:bodyPr wrap="none" rtlCol="0">
+            <a:spAutoFit/>
+          </a:bodyPr>
+          <a:lstStyle/>
+          <a:p>
+            <a:r>
+              <a:rPr lang="de-DE" dirty="0"/>
+              <a:t>Wasser (verloren)</a:t>
+            </a:r>
+            <a:endParaRPr lang="en-US" dirty="0"/>
+          </a:p>
+        </p:txBody>
+      </p:sp>
+      <p:sp>
+        <p:nvSpPr>
+          <p:cNvPr id="5" name="Textfeld 4"/>
+          <p:cNvSpPr txBox="1"/>
+          <p:nvPr/>
+        </p:nvSpPr>
+        <p:spPr>
+          <a:xfrm>
+            <a:off x="507326" y="4560477"/>
+            <a:ext cx="2667397" cy="369332"/>
+          </a:xfrm>
+          <a:prstGeom prst="rect">
+            <a:avLst/>
+          </a:prstGeom>
+          <a:noFill/>
+        </p:spPr>
+        <p:txBody>
+          <a:bodyPr wrap="none" rtlCol="0">
+            <a:spAutoFit/>
+          </a:bodyPr>
+          <a:lstStyle/>
+          <a:p>
+            <a:r>
+              <a:rPr lang="de-DE" dirty="0" err="1"/>
+              <a:t>Sandbox</a:t>
+            </a:r>
+            <a:r>
+              <a:rPr lang="de-DE" dirty="0"/>
+              <a:t> (höhere Reibung)</a:t>
+            </a:r>
+            <a:endParaRPr lang="en-US" dirty="0"/>
+          </a:p>
+        </p:txBody>
+      </p:sp>
+      <p:sp>
+        <p:nvSpPr>
+          <p:cNvPr id="26" name="Ellipse 25"/>
+          <p:cNvSpPr/>
+          <p:nvPr/>
+        </p:nvSpPr>
+        <p:spPr>
+          <a:xfrm>
+            <a:off x="1283629" y="865666"/>
+            <a:ext cx="250166" cy="249238"/>
+          </a:xfrm>
+          <a:prstGeom prst="ellipse">
+            <a:avLst/>
+          </a:prstGeom>
+          <a:pattFill prst="pct80">
+            <a:fgClr>
+              <a:schemeClr val="lt1"/>
+            </a:fgClr>
+            <a:bgClr>
+              <a:schemeClr val="tx1"/>
+            </a:bgClr>
+          </a:pattFill>
+        </p:spPr>
+        <p:style>
+          <a:lnRef idx="2">
+            <a:schemeClr val="dk1"/>
+          </a:lnRef>
+          <a:fillRef idx="1">
+            <a:schemeClr val="lt1"/>
+          </a:fillRef>
+          <a:effectRef idx="0">
+            <a:schemeClr val="dk1"/>
+          </a:effectRef>
+          <a:fontRef idx="minor">
+            <a:schemeClr val="dk1"/>
+          </a:fontRef>
+        </p:style>
+        <p:txBody>
+          <a:bodyPr rtlCol="0" anchor="ctr"/>
+          <a:lstStyle/>
+          <a:p>
+            <a:pPr algn="ctr"/>
+            <a:endParaRPr lang="en-US"/>
+          </a:p>
+        </p:txBody>
+      </p:sp>
+      <p:sp>
+        <p:nvSpPr>
+          <p:cNvPr id="27" name="Abgerundetes Rechteck 26"/>
+          <p:cNvSpPr/>
+          <p:nvPr/>
+        </p:nvSpPr>
+        <p:spPr>
+          <a:xfrm>
+            <a:off x="10925176" y="5342087"/>
+            <a:ext cx="962026" cy="422057"/>
+          </a:xfrm>
+          <a:prstGeom prst="roundRect">
+            <a:avLst/>
+          </a:prstGeom>
+          <a:solidFill>
+            <a:srgbClr val="95692F"/>
+          </a:solidFill>
+        </p:spPr>
+        <p:style>
+          <a:lnRef idx="2">
+            <a:schemeClr val="accent1">
+              <a:shade val="50000"/>
+            </a:schemeClr>
+          </a:lnRef>
+          <a:fillRef idx="1">
+            <a:schemeClr val="accent1"/>
+          </a:fillRef>
+          <a:effectRef idx="0">
+            <a:schemeClr val="accent1"/>
+          </a:effectRef>
+          <a:fontRef idx="minor">
+            <a:schemeClr val="lt1"/>
+          </a:fontRef>
+        </p:style>
+        <p:txBody>
+          <a:bodyPr rtlCol="0" anchor="t"/>
+          <a:lstStyle/>
+          <a:p>
+            <a:pPr algn="ctr"/>
+            <a:r>
+              <a:rPr lang="de-DE" dirty="0"/>
+              <a:t>GO</a:t>
+            </a:r>
+            <a:endParaRPr lang="en-US" dirty="0"/>
+          </a:p>
+        </p:txBody>
+      </p:sp>
+      <p:sp>
+        <p:nvSpPr>
+          <p:cNvPr id="28" name="Abgerundetes Rechteck 27"/>
+          <p:cNvSpPr/>
+          <p:nvPr/>
+        </p:nvSpPr>
+        <p:spPr>
+          <a:xfrm>
+            <a:off x="10925177" y="5825074"/>
+            <a:ext cx="990600" cy="422057"/>
+          </a:xfrm>
+          <a:prstGeom prst="roundRect">
+            <a:avLst/>
+          </a:prstGeom>
+          <a:solidFill>
+            <a:srgbClr val="95692F"/>
+          </a:solidFill>
+        </p:spPr>
+        <p:style>
+          <a:lnRef idx="2">
+            <a:schemeClr val="accent1">
+              <a:shade val="50000"/>
+            </a:schemeClr>
+          </a:lnRef>
+          <a:fillRef idx="1">
+            <a:schemeClr val="accent1"/>
+          </a:fillRef>
+          <a:effectRef idx="0">
+            <a:schemeClr val="accent1"/>
+          </a:effectRef>
+          <a:fontRef idx="minor">
+            <a:schemeClr val="lt1"/>
+          </a:fontRef>
+        </p:style>
+        <p:txBody>
+          <a:bodyPr rtlCol="0" anchor="t"/>
+          <a:lstStyle/>
+          <a:p>
+            <a:pPr algn="ctr"/>
+            <a:r>
+              <a:rPr lang="de-DE" dirty="0"/>
+              <a:t>  Pause</a:t>
+            </a:r>
+            <a:endParaRPr lang="en-US" dirty="0"/>
+          </a:p>
+        </p:txBody>
+      </p:sp>
+      <p:sp>
+        <p:nvSpPr>
+          <p:cNvPr id="29" name="Abgerundetes Rechteck 28"/>
+          <p:cNvSpPr/>
+          <p:nvPr/>
+        </p:nvSpPr>
+        <p:spPr>
+          <a:xfrm>
+            <a:off x="10925176" y="6314330"/>
+            <a:ext cx="990601" cy="422057"/>
+          </a:xfrm>
+          <a:prstGeom prst="roundRect">
+            <a:avLst/>
+          </a:prstGeom>
+          <a:solidFill>
+            <a:srgbClr val="95692F"/>
+          </a:solidFill>
+        </p:spPr>
+        <p:style>
+          <a:lnRef idx="2">
+            <a:schemeClr val="accent1">
+              <a:shade val="50000"/>
+            </a:schemeClr>
+          </a:lnRef>
+          <a:fillRef idx="1">
+            <a:schemeClr val="accent1"/>
+          </a:fillRef>
+          <a:effectRef idx="0">
+            <a:schemeClr val="accent1"/>
+          </a:effectRef>
+          <a:fontRef idx="minor">
+            <a:schemeClr val="lt1"/>
+          </a:fontRef>
+        </p:style>
+        <p:txBody>
+          <a:bodyPr rtlCol="0" anchor="t"/>
+          <a:lstStyle/>
+          <a:p>
+            <a:pPr algn="ctr"/>
+            <a:r>
+              <a:rPr lang="de-DE" dirty="0"/>
+              <a:t>  Replay</a:t>
+            </a:r>
+            <a:endParaRPr lang="en-US" dirty="0"/>
+          </a:p>
+        </p:txBody>
+      </p:sp>
+      <p:cxnSp>
+        <p:nvCxnSpPr>
+          <p:cNvPr id="30" name="Gerader Verbinder 29"/>
+          <p:cNvCxnSpPr/>
+          <p:nvPr/>
+        </p:nvCxnSpPr>
+        <p:spPr>
+          <a:xfrm>
+            <a:off x="1713062" y="3299959"/>
+            <a:ext cx="2058059" cy="439078"/>
+          </a:xfrm>
+          <a:prstGeom prst="line">
+            <a:avLst/>
+          </a:prstGeom>
+          <a:ln w="19050" cap="rnd">
+            <a:solidFill>
+              <a:schemeClr val="tx1"/>
+            </a:solidFill>
+            <a:headEnd type="oval"/>
+            <a:tailEnd type="oval"/>
+          </a:ln>
+          <a:effectLst/>
+        </p:spPr>
+        <p:style>
+          <a:lnRef idx="1">
+            <a:schemeClr val="accent1"/>
+          </a:lnRef>
+          <a:fillRef idx="0">
+            <a:schemeClr val="accent1"/>
+          </a:fillRef>
+          <a:effectRef idx="0">
+            <a:schemeClr val="accent1"/>
+          </a:effectRef>
+          <a:fontRef idx="minor">
+            <a:schemeClr val="tx1"/>
+          </a:fontRef>
+        </p:style>
+      </p:cxnSp>
+      <p:sp>
+        <p:nvSpPr>
+          <p:cNvPr id="31" name="Abgerundetes Rechteck 30"/>
+          <p:cNvSpPr/>
+          <p:nvPr/>
+        </p:nvSpPr>
+        <p:spPr>
+          <a:xfrm>
+            <a:off x="11058524" y="136058"/>
+            <a:ext cx="962026" cy="644992"/>
+          </a:xfrm>
+          <a:prstGeom prst="roundRect">
+            <a:avLst/>
+          </a:prstGeom>
+          <a:solidFill>
+            <a:srgbClr val="95692F"/>
+          </a:solidFill>
+        </p:spPr>
+        <p:style>
+          <a:lnRef idx="2">
+            <a:schemeClr val="accent1">
+              <a:shade val="50000"/>
+            </a:schemeClr>
+          </a:lnRef>
+          <a:fillRef idx="1">
+            <a:schemeClr val="accent1"/>
+          </a:fillRef>
+          <a:effectRef idx="0">
+            <a:schemeClr val="accent1"/>
+          </a:effectRef>
+          <a:fontRef idx="minor">
+            <a:schemeClr val="lt1"/>
+          </a:fontRef>
+        </p:style>
+        <p:txBody>
+          <a:bodyPr rtlCol="0" anchor="t"/>
+          <a:lstStyle/>
+          <a:p>
+            <a:pPr algn="ctr"/>
+            <a:r>
+              <a:rPr lang="de-DE" dirty="0" err="1"/>
+              <a:t>Timer</a:t>
+            </a:r>
+            <a:br>
+              <a:rPr lang="de-DE" dirty="0"/>
+            </a:br>
+            <a:r>
+              <a:rPr lang="de-DE" dirty="0"/>
+              <a:t>00:00</a:t>
+            </a:r>
+            <a:endParaRPr lang="en-US" dirty="0"/>
+          </a:p>
+        </p:txBody>
+      </p:sp>
+      <p:sp>
+        <p:nvSpPr>
+          <p:cNvPr id="32" name="Abgerundetes Rechteck 31"/>
+          <p:cNvSpPr/>
+          <p:nvPr/>
+        </p:nvSpPr>
+        <p:spPr>
+          <a:xfrm>
+            <a:off x="4543424" y="136058"/>
+            <a:ext cx="2809875" cy="1873717"/>
+          </a:xfrm>
+          <a:prstGeom prst="roundRect">
+            <a:avLst/>
+          </a:prstGeom>
+          <a:solidFill>
+            <a:schemeClr val="bg1">
+              <a:alpha val="41000"/>
+            </a:schemeClr>
+          </a:solidFill>
+          <a:ln>
+            <a:prstDash val="lgDash"/>
+          </a:ln>
+        </p:spPr>
+        <p:style>
+          <a:lnRef idx="2">
+            <a:schemeClr val="accent1">
+              <a:shade val="50000"/>
+            </a:schemeClr>
+          </a:lnRef>
+          <a:fillRef idx="1">
+            <a:schemeClr val="accent1"/>
+          </a:fillRef>
+          <a:effectRef idx="0">
+            <a:schemeClr val="accent1"/>
+          </a:effectRef>
+          <a:fontRef idx="minor">
+            <a:schemeClr val="lt1"/>
+          </a:fontRef>
+        </p:style>
+        <p:txBody>
+          <a:bodyPr rtlCol="0" anchor="t"/>
+          <a:lstStyle/>
+          <a:p>
+            <a:r>
+              <a:rPr lang="de-DE" dirty="0" err="1"/>
+              <a:t>Spawnarea</a:t>
+            </a:r>
+            <a:endParaRPr lang="en-US" dirty="0"/>
+          </a:p>
+        </p:txBody>
+      </p:sp>
+      <p:sp>
+        <p:nvSpPr>
+          <p:cNvPr id="8" name="Abgerundetes Rechteck 7"/>
+          <p:cNvSpPr/>
+          <p:nvPr/>
+        </p:nvSpPr>
+        <p:spPr>
+          <a:xfrm>
+            <a:off x="5181601" y="4124802"/>
+            <a:ext cx="1666875" cy="245191"/>
+          </a:xfrm>
+          <a:prstGeom prst="roundRect">
+            <a:avLst/>
+          </a:prstGeom>
+          <a:solidFill>
+            <a:schemeClr val="bg1">
+              <a:lumMod val="75000"/>
+              <a:alpha val="90000"/>
+            </a:schemeClr>
+          </a:solidFill>
+          <a:ln w="38100">
+            <a:solidFill>
+              <a:schemeClr val="tx1"/>
+            </a:solidFill>
+          </a:ln>
+        </p:spPr>
+        <p:style>
+          <a:lnRef idx="2">
+            <a:schemeClr val="accent1">
+              <a:shade val="50000"/>
+            </a:schemeClr>
+          </a:lnRef>
+          <a:fillRef idx="1">
+            <a:schemeClr val="accent1"/>
+          </a:fillRef>
+          <a:effectRef idx="0">
+            <a:schemeClr val="accent1"/>
+          </a:effectRef>
+          <a:fontRef idx="minor">
+            <a:schemeClr val="lt1"/>
+          </a:fontRef>
+        </p:style>
+        <p:txBody>
+          <a:bodyPr rtlCol="0" anchor="ctr"/>
+          <a:lstStyle/>
+          <a:p>
+            <a:pPr algn="ctr"/>
+            <a:r>
+              <a:rPr lang="de-DE" dirty="0"/>
+              <a:t>-&gt;</a:t>
+            </a:r>
+            <a:endParaRPr lang="en-US" dirty="0"/>
+          </a:p>
+        </p:txBody>
+      </p:sp>
+      <p:sp>
+        <p:nvSpPr>
+          <p:cNvPr id="33" name="Abgerundetes Rechteck 32"/>
+          <p:cNvSpPr/>
+          <p:nvPr/>
+        </p:nvSpPr>
+        <p:spPr>
+          <a:xfrm>
+            <a:off x="2672354" y="2962693"/>
+            <a:ext cx="1666875" cy="245191"/>
+          </a:xfrm>
+          <a:prstGeom prst="roundRect">
+            <a:avLst/>
+          </a:prstGeom>
+          <a:solidFill>
+            <a:schemeClr val="bg1">
+              <a:lumMod val="75000"/>
+              <a:alpha val="90000"/>
+            </a:schemeClr>
+          </a:solidFill>
+          <a:ln w="38100">
+            <a:solidFill>
+              <a:schemeClr val="tx1"/>
+            </a:solidFill>
+          </a:ln>
+        </p:spPr>
+        <p:style>
+          <a:lnRef idx="2">
+            <a:schemeClr val="accent1">
+              <a:shade val="50000"/>
+            </a:schemeClr>
+          </a:lnRef>
+          <a:fillRef idx="1">
+            <a:schemeClr val="accent1"/>
+          </a:fillRef>
+          <a:effectRef idx="0">
+            <a:schemeClr val="accent1"/>
+          </a:effectRef>
+          <a:fontRef idx="minor">
+            <a:schemeClr val="lt1"/>
+          </a:fontRef>
+        </p:style>
+        <p:txBody>
+          <a:bodyPr rtlCol="0" anchor="ctr"/>
+          <a:lstStyle/>
+          <a:p>
+            <a:pPr algn="ctr"/>
+            <a:r>
+              <a:rPr lang="de-DE" dirty="0"/>
+              <a:t>&lt;-</a:t>
+            </a:r>
+            <a:endParaRPr lang="en-US" dirty="0"/>
+          </a:p>
+        </p:txBody>
+      </p:sp>
+      <p:sp>
+        <p:nvSpPr>
+          <p:cNvPr id="9" name="Textfeld 8"/>
+          <p:cNvSpPr txBox="1"/>
+          <p:nvPr/>
+        </p:nvSpPr>
+        <p:spPr>
+          <a:xfrm>
+            <a:off x="664786" y="6338809"/>
+            <a:ext cx="401072" cy="369332"/>
+          </a:xfrm>
+          <a:prstGeom prst="rect">
+            <a:avLst/>
+          </a:prstGeom>
+          <a:noFill/>
+        </p:spPr>
+        <p:txBody>
+          <a:bodyPr wrap="none" rtlCol="0">
+            <a:spAutoFit/>
+          </a:bodyPr>
+          <a:lstStyle/>
+          <a:p>
+            <a:r>
+              <a:rPr lang="de-DE" dirty="0">
+                <a:solidFill>
+                  <a:schemeClr val="bg1"/>
+                </a:solidFill>
+              </a:rPr>
+              <a:t>2x</a:t>
+            </a:r>
+            <a:endParaRPr lang="en-US" dirty="0">
+              <a:solidFill>
+                <a:schemeClr val="bg1"/>
+              </a:solidFill>
+            </a:endParaRPr>
+          </a:p>
+        </p:txBody>
+      </p:sp>
+      <p:sp>
+        <p:nvSpPr>
+          <p:cNvPr id="34" name="Textfeld 33"/>
+          <p:cNvSpPr txBox="1"/>
+          <p:nvPr/>
+        </p:nvSpPr>
+        <p:spPr>
+          <a:xfrm>
+            <a:off x="1529638" y="6347234"/>
+            <a:ext cx="401072" cy="369332"/>
+          </a:xfrm>
+          <a:prstGeom prst="rect">
+            <a:avLst/>
+          </a:prstGeom>
+          <a:noFill/>
+        </p:spPr>
+        <p:txBody>
+          <a:bodyPr wrap="none" rtlCol="0">
+            <a:spAutoFit/>
+          </a:bodyPr>
+          <a:lstStyle/>
+          <a:p>
+            <a:r>
+              <a:rPr lang="de-DE" dirty="0">
+                <a:solidFill>
+                  <a:schemeClr val="bg1"/>
+                </a:solidFill>
+              </a:rPr>
+              <a:t>0x</a:t>
+            </a:r>
+            <a:endParaRPr lang="en-US" dirty="0">
+              <a:solidFill>
+                <a:schemeClr val="bg1"/>
+              </a:solidFill>
+            </a:endParaRPr>
+          </a:p>
+        </p:txBody>
+      </p:sp>
+      <p:sp>
+        <p:nvSpPr>
+          <p:cNvPr id="35" name="Textfeld 34"/>
+          <p:cNvSpPr txBox="1"/>
+          <p:nvPr/>
+        </p:nvSpPr>
+        <p:spPr>
+          <a:xfrm>
+            <a:off x="2428364" y="6332357"/>
+            <a:ext cx="401072" cy="369332"/>
+          </a:xfrm>
+          <a:prstGeom prst="rect">
+            <a:avLst/>
+          </a:prstGeom>
+          <a:noFill/>
+        </p:spPr>
+        <p:txBody>
+          <a:bodyPr wrap="none" rtlCol="0">
+            <a:spAutoFit/>
+          </a:bodyPr>
+          <a:lstStyle/>
+          <a:p>
+            <a:r>
+              <a:rPr lang="de-DE" dirty="0">
+                <a:solidFill>
+                  <a:schemeClr val="bg1"/>
+                </a:solidFill>
+              </a:rPr>
+              <a:t>1x</a:t>
+            </a:r>
+            <a:endParaRPr lang="en-US" dirty="0">
+              <a:solidFill>
+                <a:schemeClr val="bg1"/>
+              </a:solidFill>
+            </a:endParaRPr>
+          </a:p>
+        </p:txBody>
+      </p:sp>
+      <p:sp>
+        <p:nvSpPr>
+          <p:cNvPr id="36" name="Textfeld 35"/>
+          <p:cNvSpPr txBox="1"/>
+          <p:nvPr/>
+        </p:nvSpPr>
+        <p:spPr>
+          <a:xfrm>
+            <a:off x="3460348" y="6324643"/>
+            <a:ext cx="401072" cy="369332"/>
+          </a:xfrm>
+          <a:prstGeom prst="rect">
+            <a:avLst/>
+          </a:prstGeom>
+          <a:noFill/>
+        </p:spPr>
+        <p:txBody>
+          <a:bodyPr wrap="none" rtlCol="0">
+            <a:spAutoFit/>
+          </a:bodyPr>
+          <a:lstStyle/>
+          <a:p>
+            <a:r>
+              <a:rPr lang="de-DE" dirty="0">
+                <a:solidFill>
+                  <a:schemeClr val="bg1"/>
+                </a:solidFill>
+              </a:rPr>
+              <a:t>2x</a:t>
+            </a:r>
+            <a:endParaRPr lang="en-US" dirty="0">
+              <a:solidFill>
+                <a:schemeClr val="bg1"/>
+              </a:solidFill>
+            </a:endParaRPr>
+          </a:p>
+        </p:txBody>
+      </p:sp>
+      <p:sp>
+        <p:nvSpPr>
+          <p:cNvPr id="37" name="Abgerundetes Rechteck 36"/>
+          <p:cNvSpPr/>
+          <p:nvPr/>
+        </p:nvSpPr>
+        <p:spPr>
+          <a:xfrm>
+            <a:off x="4483377" y="5401248"/>
+            <a:ext cx="564873" cy="608569"/>
+          </a:xfrm>
+          <a:prstGeom prst="roundRect">
+            <a:avLst/>
+          </a:prstGeom>
+          <a:solidFill>
+            <a:srgbClr val="95692F">
+              <a:alpha val="74000"/>
+            </a:srgbClr>
+          </a:solidFill>
+          <a:ln>
+            <a:noFill/>
+          </a:ln>
+        </p:spPr>
+        <p:style>
+          <a:lnRef idx="2">
+            <a:schemeClr val="accent1">
+              <a:shade val="50000"/>
+            </a:schemeClr>
+          </a:lnRef>
+          <a:fillRef idx="1">
+            <a:schemeClr val="accent1"/>
+          </a:fillRef>
+          <a:effectRef idx="0">
+            <a:schemeClr val="accent1"/>
+          </a:effectRef>
+          <a:fontRef idx="minor">
+            <a:schemeClr val="lt1"/>
+          </a:fontRef>
+        </p:style>
+        <p:txBody>
+          <a:bodyPr rtlCol="0" anchor="t"/>
+          <a:lstStyle/>
+          <a:p>
+            <a:endParaRPr lang="en-US" dirty="0"/>
+          </a:p>
+        </p:txBody>
+      </p:sp>
+      <p:sp>
+        <p:nvSpPr>
+          <p:cNvPr id="38" name="Rechteck 37"/>
+          <p:cNvSpPr/>
+          <p:nvPr/>
+        </p:nvSpPr>
+        <p:spPr>
+          <a:xfrm>
+            <a:off x="505246" y="5766435"/>
+            <a:ext cx="681486" cy="600444"/>
+          </a:xfrm>
+          <a:prstGeom prst="rect">
+            <a:avLst/>
+          </a:prstGeom>
+          <a:solidFill>
+            <a:schemeClr val="accent4">
+              <a:lumMod val="50000"/>
+            </a:schemeClr>
+          </a:solidFill>
+          <a:ln>
+            <a:solidFill>
+              <a:schemeClr val="tx1"/>
+            </a:solidFill>
+          </a:ln>
+        </p:spPr>
+        <p:style>
+          <a:lnRef idx="2">
+            <a:schemeClr val="accent1">
+              <a:shade val="50000"/>
+            </a:schemeClr>
+          </a:lnRef>
+          <a:fillRef idx="1">
+            <a:schemeClr val="accent1"/>
+          </a:fillRef>
+          <a:effectRef idx="0">
+            <a:schemeClr val="accent1"/>
+          </a:effectRef>
+          <a:fontRef idx="minor">
+            <a:schemeClr val="lt1"/>
+          </a:fontRef>
+        </p:style>
+        <p:txBody>
+          <a:bodyPr rtlCol="0" anchor="ctr"/>
+          <a:lstStyle/>
+          <a:p>
+            <a:pPr algn="ctr"/>
+            <a:endParaRPr lang="en-US"/>
+          </a:p>
+        </p:txBody>
+      </p:sp>
+      <p:sp>
+        <p:nvSpPr>
+          <p:cNvPr id="39" name="Gleichschenkliges Dreieck 38"/>
+          <p:cNvSpPr/>
+          <p:nvPr/>
+        </p:nvSpPr>
+        <p:spPr>
+          <a:xfrm>
+            <a:off x="2256408" y="5758112"/>
+            <a:ext cx="715992" cy="574245"/>
+          </a:xfrm>
+          <a:prstGeom prst="triangle">
+            <a:avLst/>
+          </a:prstGeom>
+          <a:solidFill>
+            <a:schemeClr val="accent4">
+              <a:lumMod val="50000"/>
+            </a:schemeClr>
+          </a:solidFill>
+          <a:ln>
+            <a:solidFill>
+              <a:schemeClr val="tx1"/>
+            </a:solidFill>
+          </a:ln>
+        </p:spPr>
+        <p:style>
+          <a:lnRef idx="2">
+            <a:schemeClr val="accent1">
+              <a:shade val="50000"/>
+            </a:schemeClr>
+          </a:lnRef>
+          <a:fillRef idx="1">
+            <a:schemeClr val="accent1"/>
+          </a:fillRef>
+          <a:effectRef idx="0">
+            <a:schemeClr val="accent1"/>
+          </a:effectRef>
+          <a:fontRef idx="minor">
+            <a:schemeClr val="lt1"/>
+          </a:fontRef>
+        </p:style>
+        <p:txBody>
+          <a:bodyPr rtlCol="0" anchor="ctr"/>
+          <a:lstStyle/>
+          <a:p>
+            <a:pPr algn="ctr"/>
+            <a:endParaRPr lang="en-US"/>
+          </a:p>
+        </p:txBody>
+      </p:sp>
+      <p:pic>
+        <p:nvPicPr>
+          <p:cNvPr id="10" name="Grafik 9"/>
+          <p:cNvPicPr>
+            <a:picLocks noChangeAspect="1"/>
+          </p:cNvPicPr>
+          <p:nvPr/>
+        </p:nvPicPr>
+        <p:blipFill>
+          <a:blip r:embed="rId3" cstate="print">
+            <a:extLst>
+              <a:ext uri="{28A0092B-C50C-407E-A947-70E740481C1C}">
+                <a14:useLocalDpi xmlns:a14="http://schemas.microsoft.com/office/drawing/2010/main" val="0"/>
+              </a:ext>
+            </a:extLst>
+          </a:blip>
+          <a:stretch>
+            <a:fillRect/>
+          </a:stretch>
+        </p:blipFill>
+        <p:spPr>
+          <a:xfrm>
+            <a:off x="4551268" y="5486494"/>
+            <a:ext cx="427987" cy="427987"/>
+          </a:xfrm>
+          <a:prstGeom prst="rect">
+            <a:avLst/>
+          </a:prstGeom>
+        </p:spPr>
+      </p:pic>
+      <p:cxnSp>
+        <p:nvCxnSpPr>
+          <p:cNvPr id="40" name="Gerader Verbinder 39"/>
+          <p:cNvCxnSpPr/>
+          <p:nvPr/>
+        </p:nvCxnSpPr>
+        <p:spPr>
+          <a:xfrm>
+            <a:off x="6796112" y="4446034"/>
+            <a:ext cx="1442191" cy="303918"/>
+          </a:xfrm>
+          <a:prstGeom prst="line">
+            <a:avLst/>
+          </a:prstGeom>
+          <a:ln w="19050" cap="rnd">
+            <a:solidFill>
+              <a:schemeClr val="tx1"/>
+            </a:solidFill>
+            <a:headEnd type="oval"/>
+            <a:tailEnd type="oval"/>
+          </a:ln>
+        </p:spPr>
+        <p:style>
+          <a:lnRef idx="1">
+            <a:schemeClr val="accent1"/>
+          </a:lnRef>
+          <a:fillRef idx="0">
+            <a:schemeClr val="accent1"/>
+          </a:fillRef>
+          <a:effectRef idx="0">
+            <a:schemeClr val="accent1"/>
+          </a:effectRef>
+          <a:fontRef idx="minor">
+            <a:schemeClr val="tx1"/>
+          </a:fontRef>
+        </p:style>
+      </p:cxnSp>
+      <p:sp>
+        <p:nvSpPr>
+          <p:cNvPr id="42" name="Rechteck 41"/>
+          <p:cNvSpPr/>
+          <p:nvPr/>
+        </p:nvSpPr>
+        <p:spPr>
+          <a:xfrm>
+            <a:off x="9002780" y="4271545"/>
+            <a:ext cx="681486" cy="600444"/>
+          </a:xfrm>
+          <a:prstGeom prst="rect">
+            <a:avLst/>
+          </a:prstGeom>
+          <a:solidFill>
+            <a:schemeClr val="accent4">
+              <a:lumMod val="50000"/>
+            </a:schemeClr>
+          </a:solidFill>
+          <a:ln>
+            <a:solidFill>
+              <a:schemeClr val="tx1"/>
+            </a:solidFill>
+          </a:ln>
+        </p:spPr>
+        <p:style>
+          <a:lnRef idx="2">
+            <a:schemeClr val="accent1">
+              <a:shade val="50000"/>
+            </a:schemeClr>
+          </a:lnRef>
+          <a:fillRef idx="1">
+            <a:schemeClr val="accent1"/>
+          </a:fillRef>
+          <a:effectRef idx="0">
+            <a:schemeClr val="accent1"/>
+          </a:effectRef>
+          <a:fontRef idx="minor">
+            <a:schemeClr val="lt1"/>
+          </a:fontRef>
+        </p:style>
+        <p:txBody>
+          <a:bodyPr rtlCol="0" anchor="ctr"/>
+          <a:lstStyle/>
+          <a:p>
+            <a:pPr algn="ctr"/>
+            <a:endParaRPr lang="en-US"/>
+          </a:p>
+        </p:txBody>
+      </p:sp>
+    </p:spTree>
+    <p:extLst>
+      <p:ext uri="{BB962C8B-B14F-4D97-AF65-F5344CB8AC3E}">
+        <p14:creationId xmlns:p14="http://schemas.microsoft.com/office/powerpoint/2010/main" val="793028569"/>
       </p:ext>
     </p:extLst>
   </p:cSld>
@@ -4114,6 +6500,10 @@
             <a:avLst/>
           </a:prstGeom>
           <a:noFill/>
+          <a:ln>
+            <a:noFill/>
+          </a:ln>
+          <a:effectLst/>
         </p:spPr>
         <p:txBody>
           <a:bodyPr wrap="square" rtlCol="0">
@@ -4166,21 +6556,21 @@
             <a:pPr lvl="1"/>
             <a:r>
               <a:rPr lang="de-DE" sz="2000" dirty="0"/>
-              <a:t>	bestimmte Anzahl an Hilfsmitteln zur Auswahl (z.B. 1 Dreieck und 1 Stab)</a:t>
+              <a:t>	festgesetzte Anzahl von Hilfsmitteln je Level</a:t>
             </a:r>
           </a:p>
           <a:p>
             <a:pPr lvl="1"/>
             <a:r>
               <a:rPr lang="de-DE" sz="2000" dirty="0"/>
-              <a:t>	mit Hilfsmitteln die Bahn zum Zielbereich festlegen</a:t>
+              <a:t>	durch Hilfsmittel soll der Ball „selbständig“ ins Ziel finden</a:t>
             </a:r>
           </a:p>
           <a:p>
             <a:pPr lvl="1"/>
             <a:r>
               <a:rPr lang="de-DE" sz="2000" dirty="0"/>
-              <a:t>	Ball rollen lassen</a:t>
+              <a:t>	auf „Go“ geht’s los-&gt;Ball bewegt sich je nach physikalischen Beschaffenheit</a:t>
             </a:r>
           </a:p>
           <a:p>
@@ -4333,7 +6723,7 @@
         </p:blipFill>
         <p:spPr>
           <a:xfrm>
-            <a:off x="6103401" y="1941931"/>
+            <a:off x="6027201" y="1981009"/>
             <a:ext cx="5435654" cy="3993696"/>
           </a:xfrm>
           <a:prstGeom prst="rect">
@@ -4371,6 +6761,60 @@
           <a:chExt cx="0" cy="0"/>
         </a:xfrm>
       </p:grpSpPr>
+      <p:pic>
+        <p:nvPicPr>
+          <p:cNvPr id="4" name="Grafik 3"/>
+          <p:cNvPicPr>
+            <a:picLocks noChangeAspect="1"/>
+          </p:cNvPicPr>
+          <p:nvPr/>
+        </p:nvPicPr>
+        <p:blipFill>
+          <a:blip r:embed="rId2"/>
+          <a:stretch>
+            <a:fillRect/>
+          </a:stretch>
+        </p:blipFill>
+        <p:spPr>
+          <a:xfrm>
+            <a:off x="375063" y="581890"/>
+            <a:ext cx="7654804" cy="4298867"/>
+          </a:xfrm>
+          <a:prstGeom prst="rect">
+            <a:avLst/>
+          </a:prstGeom>
+        </p:spPr>
+      </p:pic>
+    </p:spTree>
+    <p:extLst>
+      <p:ext uri="{BB962C8B-B14F-4D97-AF65-F5344CB8AC3E}">
+        <p14:creationId xmlns:p14="http://schemas.microsoft.com/office/powerpoint/2010/main" val="2526040597"/>
+      </p:ext>
+    </p:extLst>
+  </p:cSld>
+  <p:clrMapOvr>
+    <a:masterClrMapping/>
+  </p:clrMapOvr>
+</p:sld>
+</file>
+
+<file path=ppt/slides/slide5.xml><?xml version="1.0" encoding="utf-8"?>
+<p:sld xmlns:a="http://schemas.openxmlformats.org/drawingml/2006/main" xmlns:r="http://schemas.openxmlformats.org/officeDocument/2006/relationships" xmlns:p="http://schemas.openxmlformats.org/presentationml/2006/main">
+  <p:cSld>
+    <p:spTree>
+      <p:nvGrpSpPr>
+        <p:cNvPr id="1" name=""/>
+        <p:cNvGrpSpPr/>
+        <p:nvPr/>
+      </p:nvGrpSpPr>
+      <p:grpSpPr>
+        <a:xfrm>
+          <a:off x="0" y="0"/>
+          <a:ext cx="0" cy="0"/>
+          <a:chOff x="0" y="0"/>
+          <a:chExt cx="0" cy="0"/>
+        </a:xfrm>
+      </p:grpSpPr>
       <p:sp>
         <p:nvSpPr>
           <p:cNvPr id="2" name="Titel 1"/>
@@ -4573,7 +7017,7 @@
           <p:nvPr>
             <p:extLst>
               <p:ext uri="{D42A27DB-BD31-4B8C-83A1-F6EECF244321}">
-                <p14:modId xmlns:p14="http://schemas.microsoft.com/office/powerpoint/2010/main" val="2846493709"/>
+                <p14:modId xmlns:p14="http://schemas.microsoft.com/office/powerpoint/2010/main" val="187833689"/>
               </p:ext>
             </p:extLst>
           </p:nvPr>
@@ -4605,7 +7049,7 @@
                     <a:p>
                       <a:r>
                         <a:rPr lang="de-DE" dirty="0"/>
-                        <a:t>Bildschirm</a:t>
+                        <a:t>Hauptfenster</a:t>
                       </a:r>
                     </a:p>
                   </a:txBody>
@@ -5687,14 +8131,15 @@
         <p:nvCxnSpPr>
           <p:cNvPr id="81" name="Gerader Verbinder 80"/>
           <p:cNvCxnSpPr>
+            <a:stCxn id="84" idx="1"/>
             <a:endCxn id="6" idx="0"/>
           </p:cNvCxnSpPr>
           <p:nvPr/>
         </p:nvCxnSpPr>
         <p:spPr>
           <a:xfrm>
-            <a:off x="7991278" y="4212155"/>
-            <a:ext cx="3850" cy="484443"/>
+            <a:off x="7991279" y="4387553"/>
+            <a:ext cx="3849" cy="309045"/>
           </a:xfrm>
           <a:prstGeom prst="line">
             <a:avLst/>
@@ -5722,14 +8167,62 @@
       </p:cxnSp>
       <p:sp>
         <p:nvSpPr>
-          <p:cNvPr id="82" name="Textfeld 81"/>
+          <p:cNvPr id="84" name="Flussdiagramm: Verzweigung 83"/>
+          <p:cNvSpPr/>
+          <p:nvPr/>
+        </p:nvSpPr>
+        <p:spPr>
+          <a:xfrm rot="16200000">
+            <a:off x="7911478" y="4267005"/>
+            <a:ext cx="159601" cy="81494"/>
+          </a:xfrm>
+          <a:prstGeom prst="flowChartDecision">
+            <a:avLst/>
+          </a:prstGeom>
+          <a:solidFill>
+            <a:schemeClr val="bg1"/>
+          </a:solidFill>
+          <a:ln>
+            <a:solidFill>
+              <a:schemeClr val="tx1"/>
+            </a:solidFill>
+          </a:ln>
+        </p:spPr>
+        <p:style>
+          <a:lnRef idx="2">
+            <a:schemeClr val="accent1">
+              <a:shade val="50000"/>
+            </a:schemeClr>
+          </a:lnRef>
+          <a:fillRef idx="1">
+            <a:schemeClr val="accent1"/>
+          </a:fillRef>
+          <a:effectRef idx="0">
+            <a:schemeClr val="accent1"/>
+          </a:effectRef>
+          <a:fontRef idx="minor">
+            <a:schemeClr val="lt1"/>
+          </a:fontRef>
+        </p:style>
+        <p:txBody>
+          <a:bodyPr rtlCol="0" anchor="ctr"/>
+          <a:lstStyle/>
+          <a:p>
+            <a:pPr algn="ctr"/>
+            <a:endParaRPr lang="de-DE"/>
+          </a:p>
+        </p:txBody>
+      </p:sp>
+      <p:sp>
+        <p:nvSpPr>
+          <p:cNvPr id="86" name="Textfeld 85"/>
           <p:cNvSpPr txBox="1"/>
           <p:nvPr/>
         </p:nvSpPr>
         <p:spPr>
           <a:xfrm>
-            <a:off x="8340345" y="4274729"/>
-            <a:ext cx="2838790" cy="369332"/>
+            <a:off x="8755357" y="4347948"/>
+            <a:ext cx="2964851" cy="369332"/>
           </a:xfrm>
           <a:prstGeom prst="rect">
             <a:avLst/>
@@ -5744,7 +8237,7 @@
           <a:p>
             <a:r>
               <a:rPr lang="de-DE" dirty="0"/>
-              <a:t>Assoziation „interagiert mit“</a:t>
+              <a:t>Aggregation „ist enthalten in“</a:t>
             </a:r>
           </a:p>
         </p:txBody>
@@ -5762,7 +8255,7 @@
 </p:sld>
 </file>
 
-<file path=ppt/slides/slide5.xml><?xml version="1.0" encoding="utf-8"?>
+<file path=ppt/slides/slide6.xml><?xml version="1.0" encoding="utf-8"?>
 <p:sld xmlns:a="http://schemas.openxmlformats.org/drawingml/2006/main" xmlns:r="http://schemas.openxmlformats.org/officeDocument/2006/relationships" xmlns:p="http://schemas.openxmlformats.org/presentationml/2006/main">
   <p:cSld>
     <p:spTree>
@@ -5788,7 +8281,7 @@
           <p:nvPr>
             <p:extLst>
               <p:ext uri="{D42A27DB-BD31-4B8C-83A1-F6EECF244321}">
-                <p14:modId xmlns:p14="http://schemas.microsoft.com/office/powerpoint/2010/main" val="2196497816"/>
+                <p14:modId xmlns:p14="http://schemas.microsoft.com/office/powerpoint/2010/main" val="1765981806"/>
               </p:ext>
             </p:extLst>
           </p:nvPr>
@@ -5827,7 +8320,7 @@
                     <a:p>
                       <a:r>
                         <a:rPr lang="de-DE" dirty="0"/>
-                        <a:t>Bildschirm</a:t>
+                        <a:t>Hauptfenster</a:t>
                       </a:r>
                     </a:p>
                   </a:txBody>
@@ -6106,7 +8599,7 @@
 </p:sld>
 </file>
 
-<file path=ppt/slides/slide6.xml><?xml version="1.0" encoding="utf-8"?>
+<file path=ppt/slides/slide7.xml><?xml version="1.0" encoding="utf-8"?>
 <p:sld xmlns:a="http://schemas.openxmlformats.org/drawingml/2006/main" xmlns:r="http://schemas.openxmlformats.org/officeDocument/2006/relationships" xmlns:p="http://schemas.openxmlformats.org/presentationml/2006/main">
   <p:cSld>
     <p:spTree>
@@ -7006,7 +9499,7 @@
 </p:sld>
 </file>
 
-<file path=ppt/slides/slide7.xml><?xml version="1.0" encoding="utf-8"?>
+<file path=ppt/slides/slide8.xml><?xml version="1.0" encoding="utf-8"?>
 <p:sld xmlns:a="http://schemas.openxmlformats.org/drawingml/2006/main" xmlns:r="http://schemas.openxmlformats.org/officeDocument/2006/relationships" xmlns:p="http://schemas.openxmlformats.org/presentationml/2006/main">
   <p:cSld>
     <p:spTree>
@@ -7745,8 +10238,8 @@
 </p:sld>
 </file>
 
-<file path=ppt/slides/slide8.xml><?xml version="1.0" encoding="utf-8"?>
-<p:sld xmlns:a="http://schemas.openxmlformats.org/drawingml/2006/main" xmlns:r="http://schemas.openxmlformats.org/officeDocument/2006/relationships" xmlns:p="http://schemas.openxmlformats.org/presentationml/2006/main" show="0">
+<file path=ppt/slides/slide9.xml><?xml version="1.0" encoding="utf-8"?>
+<p:sld xmlns:a="http://schemas.openxmlformats.org/drawingml/2006/main" xmlns:r="http://schemas.openxmlformats.org/officeDocument/2006/relationships" xmlns:p="http://schemas.openxmlformats.org/presentationml/2006/main">
   <p:cSld>
     <p:spTree>
       <p:nvGrpSpPr>
@@ -7771,13 +10264,13 @@
           <p:nvPr>
             <p:extLst>
               <p:ext uri="{D42A27DB-BD31-4B8C-83A1-F6EECF244321}">
-                <p14:modId xmlns:p14="http://schemas.microsoft.com/office/powerpoint/2010/main" val="2138900371"/>
+                <p14:modId xmlns:p14="http://schemas.microsoft.com/office/powerpoint/2010/main" val="531914168"/>
               </p:ext>
             </p:extLst>
           </p:nvPr>
         </p:nvGraphicFramePr>
         <p:xfrm>
-          <a:off x="5038723" y="3271838"/>
+          <a:off x="2470407" y="3077022"/>
           <a:ext cx="2469357" cy="2464594"/>
         </p:xfrm>
         <a:graphic>
@@ -7960,13 +10453,13 @@
           <p:nvPr>
             <p:extLst>
               <p:ext uri="{D42A27DB-BD31-4B8C-83A1-F6EECF244321}">
-                <p14:modId xmlns:p14="http://schemas.microsoft.com/office/powerpoint/2010/main" val="3780485301"/>
+                <p14:modId xmlns:p14="http://schemas.microsoft.com/office/powerpoint/2010/main" val="3900777798"/>
               </p:ext>
             </p:extLst>
           </p:nvPr>
         </p:nvGraphicFramePr>
         <p:xfrm>
-          <a:off x="8103393" y="3221831"/>
+          <a:off x="9469056" y="2611891"/>
           <a:ext cx="2447926" cy="2514601"/>
         </p:xfrm>
         <a:graphic>
@@ -8098,14 +10591,15 @@
         <p:nvCxnSpPr>
           <p:cNvPr id="7" name="Gerade Verbindung mit Pfeil 6"/>
           <p:cNvCxnSpPr>
-            <a:endCxn id="5" idx="2"/>
+            <a:stCxn id="4" idx="0"/>
+            <a:endCxn id="25" idx="1"/>
           </p:cNvCxnSpPr>
           <p:nvPr/>
         </p:nvCxnSpPr>
         <p:spPr>
           <a:xfrm flipV="1">
-            <a:off x="5922169" y="889634"/>
-            <a:ext cx="866775" cy="2382206"/>
+            <a:off x="3705085" y="2360932"/>
+            <a:ext cx="1957396" cy="716090"/>
           </a:xfrm>
           <a:prstGeom prst="straightConnector1">
             <a:avLst/>
@@ -8133,14 +10627,15 @@
         <p:nvCxnSpPr>
           <p:cNvPr id="8" name="Gerade Verbindung mit Pfeil 7"/>
           <p:cNvCxnSpPr>
-            <a:endCxn id="5" idx="2"/>
+            <a:stCxn id="6" idx="0"/>
+            <a:endCxn id="25" idx="3"/>
           </p:cNvCxnSpPr>
           <p:nvPr/>
         </p:nvCxnSpPr>
         <p:spPr>
           <a:xfrm flipH="1" flipV="1">
-            <a:off x="6788944" y="889634"/>
-            <a:ext cx="2305050" cy="2332198"/>
+            <a:off x="8023623" y="2360932"/>
+            <a:ext cx="2669396" cy="250959"/>
           </a:xfrm>
           <a:prstGeom prst="straightConnector1">
             <a:avLst/>
@@ -8173,14 +10668,14 @@
           <p:nvPr>
             <p:extLst>
               <p:ext uri="{D42A27DB-BD31-4B8C-83A1-F6EECF244321}">
-                <p14:modId xmlns:p14="http://schemas.microsoft.com/office/powerpoint/2010/main" val="177358024"/>
+                <p14:modId xmlns:p14="http://schemas.microsoft.com/office/powerpoint/2010/main" val="257435255"/>
               </p:ext>
             </p:extLst>
           </p:nvPr>
         </p:nvGraphicFramePr>
         <p:xfrm>
-          <a:off x="677333" y="2488406"/>
-          <a:ext cx="2361142" cy="2514601"/>
+          <a:off x="6385198" y="4592277"/>
+          <a:ext cx="2361142" cy="2265723"/>
         </p:xfrm>
         <a:graphic>
           <a:graphicData uri="http://schemas.openxmlformats.org/drawingml/2006/table">
@@ -8197,7 +10692,7 @@
                   </a:extLst>
                 </a:gridCol>
               </a:tblGrid>
-              <a:tr h="386321">
+              <a:tr h="320642">
                 <a:tc>
                   <a:txBody>
                     <a:bodyPr/>
@@ -8217,13 +10712,16 @@
                   </a:ext>
                 </a:extLst>
               </a:tr>
-              <a:tr h="856931">
+              <a:tr h="711243">
                 <a:tc>
                   <a:txBody>
                     <a:bodyPr/>
                     <a:lstStyle/>
                     <a:p>
-                      <a:endParaRPr lang="de-DE" dirty="0"/>
+                      <a:r>
+                        <a:rPr lang="de-DE" dirty="0"/>
+                        <a:t>-size</a:t>
+                      </a:r>
                     </a:p>
                   </a:txBody>
                   <a:tcPr/>
@@ -8234,7 +10732,7 @@
                   </a:ext>
                 </a:extLst>
               </a:tr>
-              <a:tr h="1271349">
+              <a:tr h="1055205">
                 <a:tc>
                   <a:txBody>
                     <a:bodyPr/>
@@ -8274,7 +10772,7 @@
                       </a:r>
                       <a:r>
                         <a:rPr lang="de-DE" dirty="0" err="1"/>
-                        <a:t>getWasAuchImmer</a:t>
+                        <a:t>getXXX</a:t>
                       </a:r>
                       <a:r>
                         <a:rPr lang="de-DE" dirty="0"/>
@@ -8301,14 +10799,15 @@
         <p:nvCxnSpPr>
           <p:cNvPr id="11" name="Gerade Verbindung mit Pfeil 10"/>
           <p:cNvCxnSpPr>
-            <a:endCxn id="4" idx="1"/>
+            <a:stCxn id="14" idx="3"/>
+            <a:endCxn id="25" idx="1"/>
           </p:cNvCxnSpPr>
           <p:nvPr/>
         </p:nvCxnSpPr>
         <p:spPr>
           <a:xfrm>
-            <a:off x="3038475" y="3421856"/>
-            <a:ext cx="2000248" cy="1082279"/>
+            <a:off x="2880846" y="1919161"/>
+            <a:ext cx="2781635" cy="441771"/>
           </a:xfrm>
           <a:prstGeom prst="straightConnector1">
             <a:avLst/>
@@ -8336,20 +10835,331 @@
         <p:nvCxnSpPr>
           <p:cNvPr id="13" name="Gewinkelter Verbinder 12"/>
           <p:cNvCxnSpPr>
+            <a:stCxn id="9" idx="3"/>
             <a:endCxn id="6" idx="2"/>
           </p:cNvCxnSpPr>
           <p:nvPr/>
         </p:nvCxnSpPr>
         <p:spPr>
-          <a:xfrm>
-            <a:off x="1800225" y="5003007"/>
-            <a:ext cx="7527131" cy="733425"/>
+          <a:xfrm flipV="1">
+            <a:off x="8746340" y="5126492"/>
+            <a:ext cx="1946679" cy="598646"/>
           </a:xfrm>
-          <a:prstGeom prst="bentConnector4">
-            <a:avLst>
-              <a:gd name="adj1" fmla="val 41870"/>
-              <a:gd name="adj2" fmla="val 131169"/>
-            </a:avLst>
+          <a:prstGeom prst="bentConnector2">
+            <a:avLst/>
+          </a:prstGeom>
+          <a:ln>
+            <a:tailEnd type="triangle"/>
+          </a:ln>
+        </p:spPr>
+        <p:style>
+          <a:lnRef idx="1">
+            <a:schemeClr val="accent1"/>
+          </a:lnRef>
+          <a:fillRef idx="0">
+            <a:schemeClr val="accent1"/>
+          </a:fillRef>
+          <a:effectRef idx="0">
+            <a:schemeClr val="accent1"/>
+          </a:effectRef>
+          <a:fontRef idx="minor">
+            <a:schemeClr val="tx1"/>
+          </a:fontRef>
+        </p:style>
+      </p:cxnSp>
+      <p:graphicFrame>
+        <p:nvGraphicFramePr>
+          <p:cNvPr id="14" name="Inhaltsplatzhalter 1"/>
+          <p:cNvGraphicFramePr>
+            <a:graphicFrameLocks/>
+          </p:cNvGraphicFramePr>
+          <p:nvPr>
+            <p:extLst>
+              <p:ext uri="{D42A27DB-BD31-4B8C-83A1-F6EECF244321}">
+                <p14:modId xmlns:p14="http://schemas.microsoft.com/office/powerpoint/2010/main" val="1876979290"/>
+              </p:ext>
+            </p:extLst>
+          </p:nvPr>
+        </p:nvGraphicFramePr>
+        <p:xfrm>
+          <a:off x="519704" y="1035620"/>
+          <a:ext cx="2361142" cy="1767082"/>
+        </p:xfrm>
+        <a:graphic>
+          <a:graphicData uri="http://schemas.openxmlformats.org/drawingml/2006/table">
+            <a:tbl>
+              <a:tblPr firstRow="1" bandRow="1">
+                <a:tableStyleId>{5940675A-B579-460E-94D1-54222C63F5DA}</a:tableStyleId>
+              </a:tblPr>
+              <a:tblGrid>
+                <a:gridCol w="2361142">
+                  <a:extLst>
+                    <a:ext uri="{9D8B030D-6E8A-4147-A177-3AD203B41FA5}">
+                      <a16:colId xmlns:a16="http://schemas.microsoft.com/office/drawing/2014/main" val="1293918394"/>
+                    </a:ext>
+                  </a:extLst>
+                </a:gridCol>
+              </a:tblGrid>
+              <a:tr h="256152">
+                <a:tc>
+                  <a:txBody>
+                    <a:bodyPr/>
+                    <a:lstStyle/>
+                    <a:p>
+                      <a:r>
+                        <a:rPr lang="de-DE" dirty="0"/>
+                        <a:t>Ball</a:t>
+                      </a:r>
+                    </a:p>
+                  </a:txBody>
+                  <a:tcPr/>
+                </a:tc>
+                <a:extLst>
+                  <a:ext uri="{0D108BD9-81ED-4DB2-BD59-A6C34878D82A}">
+                    <a16:rowId xmlns:a16="http://schemas.microsoft.com/office/drawing/2014/main" val="424887423"/>
+                  </a:ext>
+                </a:extLst>
+              </a:tr>
+              <a:tr h="448266">
+                <a:tc>
+                  <a:txBody>
+                    <a:bodyPr/>
+                    <a:lstStyle/>
+                    <a:p>
+                      <a:r>
+                        <a:rPr lang="de-DE" dirty="0"/>
+                        <a:t>-size</a:t>
+                      </a:r>
+                    </a:p>
+                    <a:p>
+                      <a:endParaRPr lang="de-DE" dirty="0"/>
+                    </a:p>
+                  </a:txBody>
+                  <a:tcPr/>
+                </a:tc>
+                <a:extLst>
+                  <a:ext uri="{0D108BD9-81ED-4DB2-BD59-A6C34878D82A}">
+                    <a16:rowId xmlns:a16="http://schemas.microsoft.com/office/drawing/2014/main" val="1445048750"/>
+                  </a:ext>
+                </a:extLst>
+              </a:tr>
+              <a:tr h="761242">
+                <a:tc>
+                  <a:txBody>
+                    <a:bodyPr/>
+                    <a:lstStyle/>
+                    <a:p>
+                      <a:r>
+                        <a:rPr lang="de-DE" dirty="0"/>
+                        <a:t>+</a:t>
+                      </a:r>
+                      <a:r>
+                        <a:rPr lang="de-DE" dirty="0" err="1"/>
+                        <a:t>getBall</a:t>
+                      </a:r>
+                      <a:r>
+                        <a:rPr lang="de-DE" dirty="0"/>
+                        <a:t>()</a:t>
+                      </a:r>
+                    </a:p>
+                    <a:p>
+                      <a:endParaRPr lang="de-DE" dirty="0"/>
+                    </a:p>
+                  </a:txBody>
+                  <a:tcPr/>
+                </a:tc>
+                <a:extLst>
+                  <a:ext uri="{0D108BD9-81ED-4DB2-BD59-A6C34878D82A}">
+                    <a16:rowId xmlns:a16="http://schemas.microsoft.com/office/drawing/2014/main" val="916365280"/>
+                  </a:ext>
+                </a:extLst>
+              </a:tr>
+            </a:tbl>
+          </a:graphicData>
+        </a:graphic>
+      </p:graphicFrame>
+      <p:cxnSp>
+        <p:nvCxnSpPr>
+          <p:cNvPr id="20" name="Gerade Verbindung mit Pfeil 19"/>
+          <p:cNvCxnSpPr>
+            <a:stCxn id="9" idx="1"/>
+            <a:endCxn id="4" idx="2"/>
+          </p:cNvCxnSpPr>
+          <p:nvPr/>
+        </p:nvCxnSpPr>
+        <p:spPr>
+          <a:xfrm flipH="1" flipV="1">
+            <a:off x="3705085" y="5541616"/>
+            <a:ext cx="2680113" cy="183522"/>
+          </a:xfrm>
+          <a:prstGeom prst="straightConnector1">
+            <a:avLst/>
+          </a:prstGeom>
+          <a:ln>
+            <a:tailEnd type="triangle"/>
+          </a:ln>
+        </p:spPr>
+        <p:style>
+          <a:lnRef idx="1">
+            <a:schemeClr val="accent1"/>
+          </a:lnRef>
+          <a:fillRef idx="0">
+            <a:schemeClr val="accent1"/>
+          </a:fillRef>
+          <a:effectRef idx="0">
+            <a:schemeClr val="accent1"/>
+          </a:effectRef>
+          <a:fontRef idx="minor">
+            <a:schemeClr val="tx1"/>
+          </a:fontRef>
+        </p:style>
+      </p:cxnSp>
+      <p:graphicFrame>
+        <p:nvGraphicFramePr>
+          <p:cNvPr id="25" name="Inhaltsplatzhalter 1"/>
+          <p:cNvGraphicFramePr>
+            <a:graphicFrameLocks/>
+          </p:cNvGraphicFramePr>
+          <p:nvPr>
+            <p:extLst>
+              <p:ext uri="{D42A27DB-BD31-4B8C-83A1-F6EECF244321}">
+                <p14:modId xmlns:p14="http://schemas.microsoft.com/office/powerpoint/2010/main" val="550897886"/>
+              </p:ext>
+            </p:extLst>
+          </p:nvPr>
+        </p:nvGraphicFramePr>
+        <p:xfrm>
+          <a:off x="5662481" y="1203071"/>
+          <a:ext cx="2361142" cy="2315722"/>
+        </p:xfrm>
+        <a:graphic>
+          <a:graphicData uri="http://schemas.openxmlformats.org/drawingml/2006/table">
+            <a:tbl>
+              <a:tblPr firstRow="1" bandRow="1">
+                <a:tableStyleId>{5940675A-B579-460E-94D1-54222C63F5DA}</a:tableStyleId>
+              </a:tblPr>
+              <a:tblGrid>
+                <a:gridCol w="2361142">
+                  <a:extLst>
+                    <a:ext uri="{9D8B030D-6E8A-4147-A177-3AD203B41FA5}">
+                      <a16:colId xmlns:a16="http://schemas.microsoft.com/office/drawing/2014/main" val="1293918394"/>
+                    </a:ext>
+                  </a:extLst>
+                </a:gridCol>
+              </a:tblGrid>
+              <a:tr h="256152">
+                <a:tc>
+                  <a:txBody>
+                    <a:bodyPr/>
+                    <a:lstStyle/>
+                    <a:p>
+                      <a:r>
+                        <a:rPr lang="de-DE" dirty="0"/>
+                        <a:t>Physik</a:t>
+                      </a:r>
+                    </a:p>
+                  </a:txBody>
+                  <a:tcPr/>
+                </a:tc>
+                <a:extLst>
+                  <a:ext uri="{0D108BD9-81ED-4DB2-BD59-A6C34878D82A}">
+                    <a16:rowId xmlns:a16="http://schemas.microsoft.com/office/drawing/2014/main" val="424887423"/>
+                  </a:ext>
+                </a:extLst>
+              </a:tr>
+              <a:tr h="448266">
+                <a:tc>
+                  <a:txBody>
+                    <a:bodyPr/>
+                    <a:lstStyle/>
+                    <a:p>
+                      <a:r>
+                        <a:rPr lang="de-DE" dirty="0"/>
+                        <a:t>-reibung</a:t>
+                      </a:r>
+                    </a:p>
+                    <a:p>
+                      <a:r>
+                        <a:rPr lang="de-DE" dirty="0"/>
+                        <a:t>-schwerkraft</a:t>
+                      </a:r>
+                    </a:p>
+                    <a:p>
+                      <a:endParaRPr lang="de-DE" dirty="0"/>
+                    </a:p>
+                    <a:p>
+                      <a:endParaRPr lang="de-DE" dirty="0"/>
+                    </a:p>
+                  </a:txBody>
+                  <a:tcPr/>
+                </a:tc>
+                <a:extLst>
+                  <a:ext uri="{0D108BD9-81ED-4DB2-BD59-A6C34878D82A}">
+                    <a16:rowId xmlns:a16="http://schemas.microsoft.com/office/drawing/2014/main" val="1445048750"/>
+                  </a:ext>
+                </a:extLst>
+              </a:tr>
+              <a:tr h="761242">
+                <a:tc>
+                  <a:txBody>
+                    <a:bodyPr/>
+                    <a:lstStyle/>
+                    <a:p>
+                      <a:r>
+                        <a:rPr lang="de-DE" dirty="0"/>
+                        <a:t>+</a:t>
+                      </a:r>
+                      <a:r>
+                        <a:rPr lang="de-DE" dirty="0" err="1"/>
+                        <a:t>getSpeed</a:t>
+                      </a:r>
+                      <a:r>
+                        <a:rPr lang="de-DE" dirty="0"/>
+                        <a:t>()</a:t>
+                      </a:r>
+                    </a:p>
+                    <a:p>
+                      <a:r>
+                        <a:rPr lang="de-DE" dirty="0"/>
+                        <a:t>+</a:t>
+                      </a:r>
+                      <a:r>
+                        <a:rPr lang="de-DE" dirty="0" err="1"/>
+                        <a:t>getGravity</a:t>
+                      </a:r>
+                      <a:r>
+                        <a:rPr lang="de-DE" dirty="0"/>
+                        <a:t>()</a:t>
+                      </a:r>
+                    </a:p>
+                  </a:txBody>
+                  <a:tcPr/>
+                </a:tc>
+                <a:extLst>
+                  <a:ext uri="{0D108BD9-81ED-4DB2-BD59-A6C34878D82A}">
+                    <a16:rowId xmlns:a16="http://schemas.microsoft.com/office/drawing/2014/main" val="916365280"/>
+                  </a:ext>
+                </a:extLst>
+              </a:tr>
+            </a:tbl>
+          </a:graphicData>
+        </a:graphic>
+      </p:graphicFrame>
+      <p:cxnSp>
+        <p:nvCxnSpPr>
+          <p:cNvPr id="39" name="Gerade Verbindung mit Pfeil 38"/>
+          <p:cNvCxnSpPr>
+            <a:endCxn id="5" idx="2"/>
+          </p:cNvCxnSpPr>
+          <p:nvPr/>
+        </p:nvCxnSpPr>
+        <p:spPr>
+          <a:xfrm flipV="1">
+            <a:off x="6788944" y="889634"/>
+            <a:ext cx="0" cy="313437"/>
+          </a:xfrm>
+          <a:prstGeom prst="straightConnector1">
+            <a:avLst/>
           </a:prstGeom>
           <a:ln>
             <a:tailEnd type="triangle"/>

</xml_diff>

<commit_message>
Version mit Feedback auf Erster Slide
</commit_message>
<xml_diff>
--- a/BallFall.pptx
+++ b/BallFall.pptx
@@ -4227,8 +4227,8 @@
         </p:nvSpPr>
         <p:spPr>
           <a:xfrm>
-            <a:off x="2977375" y="2018371"/>
-            <a:ext cx="6394251" cy="2831544"/>
+            <a:off x="2535844" y="881511"/>
+            <a:ext cx="6552115" cy="5878532"/>
           </a:xfrm>
           <a:prstGeom prst="rect">
             <a:avLst/>
@@ -4260,6 +4260,66 @@
               <a:rPr lang="de-DE" dirty="0"/>
               <a:t>Maximilian, Jonas, Alexander, Florian, Victoria </a:t>
             </a:r>
+            <a:endParaRPr lang="de-DE" dirty="0" smtClean="0"/>
+          </a:p>
+          <a:p>
+            <a:endParaRPr lang="de-DE" dirty="0"/>
+          </a:p>
+          <a:p>
+            <a:r>
+              <a:rPr lang="de-DE" dirty="0" smtClean="0"/>
+              <a:t>Feedback:</a:t>
+            </a:r>
+          </a:p>
+          <a:p>
+            <a:endParaRPr lang="de-DE" dirty="0"/>
+          </a:p>
+          <a:p>
+            <a:r>
+              <a:rPr lang="de-DE" dirty="0" smtClean="0"/>
+              <a:t>Grafik schön, bitte beibehalten, </a:t>
+            </a:r>
+            <a:r>
+              <a:rPr lang="de-DE" dirty="0" err="1" smtClean="0"/>
+              <a:t>evt</a:t>
+            </a:r>
+            <a:r>
+              <a:rPr lang="de-DE" dirty="0" smtClean="0"/>
+              <a:t>. schwierig in der Einbettung.</a:t>
+            </a:r>
+          </a:p>
+          <a:p>
+            <a:r>
+              <a:rPr lang="de-DE" dirty="0" smtClean="0"/>
+              <a:t>Lieber wenige Elemente, wäre überhaupt kein Nachteil. Die sollen </a:t>
+            </a:r>
+          </a:p>
+          <a:p>
+            <a:r>
+              <a:rPr lang="de-DE" dirty="0" smtClean="0"/>
+              <a:t>dann aber funktionieren und einen flüssigen Spielfluss ermöglichen.</a:t>
+            </a:r>
+          </a:p>
+          <a:p>
+            <a:endParaRPr lang="de-DE" dirty="0"/>
+          </a:p>
+          <a:p>
+            <a:r>
+              <a:rPr lang="de-DE" dirty="0" smtClean="0"/>
+              <a:t>Schön wäre, wenn wir eigene Physik implementieren. </a:t>
+            </a:r>
+          </a:p>
+          <a:p>
+            <a:endParaRPr lang="de-DE" dirty="0" smtClean="0"/>
+          </a:p>
+          <a:p>
+            <a:r>
+              <a:rPr lang="de-DE" dirty="0" smtClean="0"/>
+              <a:t> </a:t>
+            </a:r>
+          </a:p>
+          <a:p>
+            <a:endParaRPr lang="de-DE" dirty="0"/>
           </a:p>
           <a:p>
             <a:endParaRPr lang="de-DE" dirty="0" smtClean="0"/>

</xml_diff>